<commit_message>
MOD| unititled.ipynb| Played around in jupyter notebook to get an idea how the function streak could be implemented
</commit_message>
<xml_diff>
--- a/design.pptx
+++ b/design.pptx
@@ -12,6 +12,7 @@
     <p:sldId id="259" r:id="rId7"/>
     <p:sldId id="260" r:id="rId8"/>
     <p:sldId id="261" r:id="rId9"/>
+    <p:sldId id="262" r:id="rId10"/>
   </p:sldIdLst>
   <p:sldSz cx="12192000" cy="6858000"/>
   <p:notesSz cx="7559675" cy="10691812"/>
@@ -59,7 +60,7 @@
       </p:grpSpPr>
       <p:sp>
         <p:nvSpPr>
-          <p:cNvPr id="26" name="PlaceHolder 1"/>
+          <p:cNvPr id="23" name="PlaceHolder 1"/>
           <p:cNvSpPr>
             <a:spLocks noGrp="1"/>
           </p:cNvSpPr>
@@ -69,8 +70,8 @@
         </p:nvSpPr>
         <p:spPr>
           <a:xfrm>
-            <a:off x="838080" y="365040"/>
-            <a:ext cx="10515240" cy="1325160"/>
+            <a:off x="609480" y="273600"/>
+            <a:ext cx="10972440" cy="1144800"/>
           </a:xfrm>
           <a:prstGeom prst="rect">
             <a:avLst/>
@@ -79,18 +80,16 @@
         <p:txBody>
           <a:bodyPr lIns="0" rIns="0" tIns="0" bIns="0" anchor="ctr"/>
           <a:p>
-            <a:endParaRPr b="0" lang="de-DE" sz="1800" spc="-1" strike="noStrike">
-              <a:solidFill>
-                <a:srgbClr val="000000"/>
-              </a:solidFill>
-              <a:latin typeface="Calibri"/>
-            </a:endParaRPr>
-          </a:p>
-        </p:txBody>
-      </p:sp>
-      <p:sp>
-        <p:nvSpPr>
-          <p:cNvPr id="27" name="PlaceHolder 2"/>
+            <a:pPr algn="ctr"/>
+            <a:endParaRPr b="0" lang="en-US" sz="4400" spc="-1" strike="noStrike">
+              <a:latin typeface="Arial"/>
+            </a:endParaRPr>
+          </a:p>
+        </p:txBody>
+      </p:sp>
+      <p:sp>
+        <p:nvSpPr>
+          <p:cNvPr id="24" name="PlaceHolder 2"/>
           <p:cNvSpPr>
             <a:spLocks noGrp="1"/>
           </p:cNvSpPr>
@@ -100,8 +99,8 @@
         </p:nvSpPr>
         <p:spPr>
           <a:xfrm>
-            <a:off x="838080" y="1825560"/>
-            <a:ext cx="10515240" cy="2075040"/>
+            <a:off x="609480" y="1604520"/>
+            <a:ext cx="10972440" cy="1896840"/>
           </a:xfrm>
           <a:prstGeom prst="rect">
             <a:avLst/>
@@ -112,18 +111,15 @@
             <a:normAutofit/>
           </a:bodyPr>
           <a:p>
-            <a:endParaRPr b="0" lang="de-DE" sz="2800" spc="-1" strike="noStrike">
-              <a:solidFill>
-                <a:srgbClr val="000000"/>
-              </a:solidFill>
-              <a:latin typeface="Calibri"/>
-            </a:endParaRPr>
-          </a:p>
-        </p:txBody>
-      </p:sp>
-      <p:sp>
-        <p:nvSpPr>
-          <p:cNvPr id="28" name="PlaceHolder 3"/>
+            <a:endParaRPr b="0" lang="en-US" sz="3200" spc="-1" strike="noStrike">
+              <a:latin typeface="Arial"/>
+            </a:endParaRPr>
+          </a:p>
+        </p:txBody>
+      </p:sp>
+      <p:sp>
+        <p:nvSpPr>
+          <p:cNvPr id="25" name="PlaceHolder 3"/>
           <p:cNvSpPr>
             <a:spLocks noGrp="1"/>
           </p:cNvSpPr>
@@ -133,8 +129,8 @@
         </p:nvSpPr>
         <p:spPr>
           <a:xfrm>
-            <a:off x="838080" y="4098240"/>
-            <a:ext cx="10515240" cy="2075040"/>
+            <a:off x="609480" y="3682080"/>
+            <a:ext cx="10972440" cy="1896840"/>
           </a:xfrm>
           <a:prstGeom prst="rect">
             <a:avLst/>
@@ -145,11 +141,8 @@
             <a:normAutofit/>
           </a:bodyPr>
           <a:p>
-            <a:endParaRPr b="0" lang="de-DE" sz="2800" spc="-1" strike="noStrike">
-              <a:solidFill>
-                <a:srgbClr val="000000"/>
-              </a:solidFill>
-              <a:latin typeface="Calibri"/>
+            <a:endParaRPr b="0" lang="en-US" sz="3200" spc="-1" strike="noStrike">
+              <a:latin typeface="Arial"/>
             </a:endParaRPr>
           </a:p>
         </p:txBody>
@@ -178,7 +171,7 @@
       </p:grpSpPr>
       <p:sp>
         <p:nvSpPr>
-          <p:cNvPr id="29" name="PlaceHolder 1"/>
+          <p:cNvPr id="26" name="PlaceHolder 1"/>
           <p:cNvSpPr>
             <a:spLocks noGrp="1"/>
           </p:cNvSpPr>
@@ -188,8 +181,8 @@
         </p:nvSpPr>
         <p:spPr>
           <a:xfrm>
-            <a:off x="838080" y="365040"/>
-            <a:ext cx="10515240" cy="1325160"/>
+            <a:off x="609480" y="273600"/>
+            <a:ext cx="10972440" cy="1144800"/>
           </a:xfrm>
           <a:prstGeom prst="rect">
             <a:avLst/>
@@ -198,18 +191,16 @@
         <p:txBody>
           <a:bodyPr lIns="0" rIns="0" tIns="0" bIns="0" anchor="ctr"/>
           <a:p>
-            <a:endParaRPr b="0" lang="de-DE" sz="1800" spc="-1" strike="noStrike">
-              <a:solidFill>
-                <a:srgbClr val="000000"/>
-              </a:solidFill>
-              <a:latin typeface="Calibri"/>
-            </a:endParaRPr>
-          </a:p>
-        </p:txBody>
-      </p:sp>
-      <p:sp>
-        <p:nvSpPr>
-          <p:cNvPr id="30" name="PlaceHolder 2"/>
+            <a:pPr algn="ctr"/>
+            <a:endParaRPr b="0" lang="en-US" sz="4400" spc="-1" strike="noStrike">
+              <a:latin typeface="Arial"/>
+            </a:endParaRPr>
+          </a:p>
+        </p:txBody>
+      </p:sp>
+      <p:sp>
+        <p:nvSpPr>
+          <p:cNvPr id="27" name="PlaceHolder 2"/>
           <p:cNvSpPr>
             <a:spLocks noGrp="1"/>
           </p:cNvSpPr>
@@ -219,8 +210,8 @@
         </p:nvSpPr>
         <p:spPr>
           <a:xfrm>
-            <a:off x="838080" y="1825560"/>
-            <a:ext cx="5131080" cy="2075040"/>
+            <a:off x="609480" y="1604520"/>
+            <a:ext cx="5354280" cy="1896840"/>
           </a:xfrm>
           <a:prstGeom prst="rect">
             <a:avLst/>
@@ -231,18 +222,15 @@
             <a:normAutofit/>
           </a:bodyPr>
           <a:p>
-            <a:endParaRPr b="0" lang="de-DE" sz="2800" spc="-1" strike="noStrike">
-              <a:solidFill>
-                <a:srgbClr val="000000"/>
-              </a:solidFill>
-              <a:latin typeface="Calibri"/>
-            </a:endParaRPr>
-          </a:p>
-        </p:txBody>
-      </p:sp>
-      <p:sp>
-        <p:nvSpPr>
-          <p:cNvPr id="31" name="PlaceHolder 3"/>
+            <a:endParaRPr b="0" lang="en-US" sz="3200" spc="-1" strike="noStrike">
+              <a:latin typeface="Arial"/>
+            </a:endParaRPr>
+          </a:p>
+        </p:txBody>
+      </p:sp>
+      <p:sp>
+        <p:nvSpPr>
+          <p:cNvPr id="28" name="PlaceHolder 3"/>
           <p:cNvSpPr>
             <a:spLocks noGrp="1"/>
           </p:cNvSpPr>
@@ -252,8 +240,8 @@
         </p:nvSpPr>
         <p:spPr>
           <a:xfrm>
-            <a:off x="6226200" y="1825560"/>
-            <a:ext cx="5131080" cy="2075040"/>
+            <a:off x="6231960" y="1604520"/>
+            <a:ext cx="5354280" cy="1896840"/>
           </a:xfrm>
           <a:prstGeom prst="rect">
             <a:avLst/>
@@ -264,18 +252,15 @@
             <a:normAutofit/>
           </a:bodyPr>
           <a:p>
-            <a:endParaRPr b="0" lang="de-DE" sz="2800" spc="-1" strike="noStrike">
-              <a:solidFill>
-                <a:srgbClr val="000000"/>
-              </a:solidFill>
-              <a:latin typeface="Calibri"/>
-            </a:endParaRPr>
-          </a:p>
-        </p:txBody>
-      </p:sp>
-      <p:sp>
-        <p:nvSpPr>
-          <p:cNvPr id="32" name="PlaceHolder 4"/>
+            <a:endParaRPr b="0" lang="en-US" sz="3200" spc="-1" strike="noStrike">
+              <a:latin typeface="Arial"/>
+            </a:endParaRPr>
+          </a:p>
+        </p:txBody>
+      </p:sp>
+      <p:sp>
+        <p:nvSpPr>
+          <p:cNvPr id="29" name="PlaceHolder 4"/>
           <p:cNvSpPr>
             <a:spLocks noGrp="1"/>
           </p:cNvSpPr>
@@ -285,8 +270,8 @@
         </p:nvSpPr>
         <p:spPr>
           <a:xfrm>
-            <a:off x="838080" y="4098240"/>
-            <a:ext cx="5131080" cy="2075040"/>
+            <a:off x="609480" y="3682080"/>
+            <a:ext cx="5354280" cy="1896840"/>
           </a:xfrm>
           <a:prstGeom prst="rect">
             <a:avLst/>
@@ -297,18 +282,15 @@
             <a:normAutofit/>
           </a:bodyPr>
           <a:p>
-            <a:endParaRPr b="0" lang="de-DE" sz="2800" spc="-1" strike="noStrike">
-              <a:solidFill>
-                <a:srgbClr val="000000"/>
-              </a:solidFill>
-              <a:latin typeface="Calibri"/>
-            </a:endParaRPr>
-          </a:p>
-        </p:txBody>
-      </p:sp>
-      <p:sp>
-        <p:nvSpPr>
-          <p:cNvPr id="33" name="PlaceHolder 5"/>
+            <a:endParaRPr b="0" lang="en-US" sz="3200" spc="-1" strike="noStrike">
+              <a:latin typeface="Arial"/>
+            </a:endParaRPr>
+          </a:p>
+        </p:txBody>
+      </p:sp>
+      <p:sp>
+        <p:nvSpPr>
+          <p:cNvPr id="30" name="PlaceHolder 5"/>
           <p:cNvSpPr>
             <a:spLocks noGrp="1"/>
           </p:cNvSpPr>
@@ -318,8 +300,8 @@
         </p:nvSpPr>
         <p:spPr>
           <a:xfrm>
-            <a:off x="6226200" y="4098240"/>
-            <a:ext cx="5131080" cy="2075040"/>
+            <a:off x="6231960" y="3682080"/>
+            <a:ext cx="5354280" cy="1896840"/>
           </a:xfrm>
           <a:prstGeom prst="rect">
             <a:avLst/>
@@ -330,11 +312,8 @@
             <a:normAutofit/>
           </a:bodyPr>
           <a:p>
-            <a:endParaRPr b="0" lang="de-DE" sz="2800" spc="-1" strike="noStrike">
-              <a:solidFill>
-                <a:srgbClr val="000000"/>
-              </a:solidFill>
-              <a:latin typeface="Calibri"/>
+            <a:endParaRPr b="0" lang="en-US" sz="3200" spc="-1" strike="noStrike">
+              <a:latin typeface="Arial"/>
             </a:endParaRPr>
           </a:p>
         </p:txBody>
@@ -363,7 +342,7 @@
       </p:grpSpPr>
       <p:sp>
         <p:nvSpPr>
-          <p:cNvPr id="34" name="PlaceHolder 1"/>
+          <p:cNvPr id="31" name="PlaceHolder 1"/>
           <p:cNvSpPr>
             <a:spLocks noGrp="1"/>
           </p:cNvSpPr>
@@ -373,8 +352,8 @@
         </p:nvSpPr>
         <p:spPr>
           <a:xfrm>
-            <a:off x="838080" y="365040"/>
-            <a:ext cx="10515240" cy="1325160"/>
+            <a:off x="609480" y="273600"/>
+            <a:ext cx="10972440" cy="1144800"/>
           </a:xfrm>
           <a:prstGeom prst="rect">
             <a:avLst/>
@@ -383,18 +362,16 @@
         <p:txBody>
           <a:bodyPr lIns="0" rIns="0" tIns="0" bIns="0" anchor="ctr"/>
           <a:p>
-            <a:endParaRPr b="0" lang="de-DE" sz="1800" spc="-1" strike="noStrike">
-              <a:solidFill>
-                <a:srgbClr val="000000"/>
-              </a:solidFill>
-              <a:latin typeface="Calibri"/>
-            </a:endParaRPr>
-          </a:p>
-        </p:txBody>
-      </p:sp>
-      <p:sp>
-        <p:nvSpPr>
-          <p:cNvPr id="35" name="PlaceHolder 2"/>
+            <a:pPr algn="ctr"/>
+            <a:endParaRPr b="0" lang="en-US" sz="4400" spc="-1" strike="noStrike">
+              <a:latin typeface="Arial"/>
+            </a:endParaRPr>
+          </a:p>
+        </p:txBody>
+      </p:sp>
+      <p:sp>
+        <p:nvSpPr>
+          <p:cNvPr id="32" name="PlaceHolder 2"/>
           <p:cNvSpPr>
             <a:spLocks noGrp="1"/>
           </p:cNvSpPr>
@@ -404,8 +381,8 @@
         </p:nvSpPr>
         <p:spPr>
           <a:xfrm>
-            <a:off x="838080" y="1825560"/>
-            <a:ext cx="3385800" cy="2075040"/>
+            <a:off x="609480" y="1604520"/>
+            <a:ext cx="3533040" cy="1896840"/>
           </a:xfrm>
           <a:prstGeom prst="rect">
             <a:avLst/>
@@ -416,18 +393,15 @@
             <a:normAutofit/>
           </a:bodyPr>
           <a:p>
-            <a:endParaRPr b="0" lang="de-DE" sz="2800" spc="-1" strike="noStrike">
-              <a:solidFill>
-                <a:srgbClr val="000000"/>
-              </a:solidFill>
-              <a:latin typeface="Calibri"/>
-            </a:endParaRPr>
-          </a:p>
-        </p:txBody>
-      </p:sp>
-      <p:sp>
-        <p:nvSpPr>
-          <p:cNvPr id="36" name="PlaceHolder 3"/>
+            <a:endParaRPr b="0" lang="en-US" sz="3200" spc="-1" strike="noStrike">
+              <a:latin typeface="Arial"/>
+            </a:endParaRPr>
+          </a:p>
+        </p:txBody>
+      </p:sp>
+      <p:sp>
+        <p:nvSpPr>
+          <p:cNvPr id="33" name="PlaceHolder 3"/>
           <p:cNvSpPr>
             <a:spLocks noGrp="1"/>
           </p:cNvSpPr>
@@ -437,8 +411,8 @@
         </p:nvSpPr>
         <p:spPr>
           <a:xfrm>
-            <a:off x="4393440" y="1825560"/>
-            <a:ext cx="3385800" cy="2075040"/>
+            <a:off x="4319640" y="1604520"/>
+            <a:ext cx="3533040" cy="1896840"/>
           </a:xfrm>
           <a:prstGeom prst="rect">
             <a:avLst/>
@@ -449,18 +423,15 @@
             <a:normAutofit/>
           </a:bodyPr>
           <a:p>
-            <a:endParaRPr b="0" lang="de-DE" sz="2800" spc="-1" strike="noStrike">
-              <a:solidFill>
-                <a:srgbClr val="000000"/>
-              </a:solidFill>
-              <a:latin typeface="Calibri"/>
-            </a:endParaRPr>
-          </a:p>
-        </p:txBody>
-      </p:sp>
-      <p:sp>
-        <p:nvSpPr>
-          <p:cNvPr id="37" name="PlaceHolder 4"/>
+            <a:endParaRPr b="0" lang="en-US" sz="3200" spc="-1" strike="noStrike">
+              <a:latin typeface="Arial"/>
+            </a:endParaRPr>
+          </a:p>
+        </p:txBody>
+      </p:sp>
+      <p:sp>
+        <p:nvSpPr>
+          <p:cNvPr id="34" name="PlaceHolder 4"/>
           <p:cNvSpPr>
             <a:spLocks noGrp="1"/>
           </p:cNvSpPr>
@@ -470,8 +441,8 @@
         </p:nvSpPr>
         <p:spPr>
           <a:xfrm>
-            <a:off x="7949160" y="1825560"/>
-            <a:ext cx="3385800" cy="2075040"/>
+            <a:off x="8029800" y="1604520"/>
+            <a:ext cx="3533040" cy="1896840"/>
           </a:xfrm>
           <a:prstGeom prst="rect">
             <a:avLst/>
@@ -482,18 +453,15 @@
             <a:normAutofit/>
           </a:bodyPr>
           <a:p>
-            <a:endParaRPr b="0" lang="de-DE" sz="2800" spc="-1" strike="noStrike">
-              <a:solidFill>
-                <a:srgbClr val="000000"/>
-              </a:solidFill>
-              <a:latin typeface="Calibri"/>
-            </a:endParaRPr>
-          </a:p>
-        </p:txBody>
-      </p:sp>
-      <p:sp>
-        <p:nvSpPr>
-          <p:cNvPr id="38" name="PlaceHolder 5"/>
+            <a:endParaRPr b="0" lang="en-US" sz="3200" spc="-1" strike="noStrike">
+              <a:latin typeface="Arial"/>
+            </a:endParaRPr>
+          </a:p>
+        </p:txBody>
+      </p:sp>
+      <p:sp>
+        <p:nvSpPr>
+          <p:cNvPr id="35" name="PlaceHolder 5"/>
           <p:cNvSpPr>
             <a:spLocks noGrp="1"/>
           </p:cNvSpPr>
@@ -503,8 +471,8 @@
         </p:nvSpPr>
         <p:spPr>
           <a:xfrm>
-            <a:off x="838080" y="4098240"/>
-            <a:ext cx="3385800" cy="2075040"/>
+            <a:off x="609480" y="3682080"/>
+            <a:ext cx="3533040" cy="1896840"/>
           </a:xfrm>
           <a:prstGeom prst="rect">
             <a:avLst/>
@@ -515,18 +483,15 @@
             <a:normAutofit/>
           </a:bodyPr>
           <a:p>
-            <a:endParaRPr b="0" lang="de-DE" sz="2800" spc="-1" strike="noStrike">
-              <a:solidFill>
-                <a:srgbClr val="000000"/>
-              </a:solidFill>
-              <a:latin typeface="Calibri"/>
-            </a:endParaRPr>
-          </a:p>
-        </p:txBody>
-      </p:sp>
-      <p:sp>
-        <p:nvSpPr>
-          <p:cNvPr id="39" name="PlaceHolder 6"/>
+            <a:endParaRPr b="0" lang="en-US" sz="3200" spc="-1" strike="noStrike">
+              <a:latin typeface="Arial"/>
+            </a:endParaRPr>
+          </a:p>
+        </p:txBody>
+      </p:sp>
+      <p:sp>
+        <p:nvSpPr>
+          <p:cNvPr id="36" name="PlaceHolder 6"/>
           <p:cNvSpPr>
             <a:spLocks noGrp="1"/>
           </p:cNvSpPr>
@@ -536,8 +501,8 @@
         </p:nvSpPr>
         <p:spPr>
           <a:xfrm>
-            <a:off x="4393440" y="4098240"/>
-            <a:ext cx="3385800" cy="2075040"/>
+            <a:off x="4319640" y="3682080"/>
+            <a:ext cx="3533040" cy="1896840"/>
           </a:xfrm>
           <a:prstGeom prst="rect">
             <a:avLst/>
@@ -548,18 +513,15 @@
             <a:normAutofit/>
           </a:bodyPr>
           <a:p>
-            <a:endParaRPr b="0" lang="de-DE" sz="2800" spc="-1" strike="noStrike">
-              <a:solidFill>
-                <a:srgbClr val="000000"/>
-              </a:solidFill>
-              <a:latin typeface="Calibri"/>
-            </a:endParaRPr>
-          </a:p>
-        </p:txBody>
-      </p:sp>
-      <p:sp>
-        <p:nvSpPr>
-          <p:cNvPr id="40" name="PlaceHolder 7"/>
+            <a:endParaRPr b="0" lang="en-US" sz="3200" spc="-1" strike="noStrike">
+              <a:latin typeface="Arial"/>
+            </a:endParaRPr>
+          </a:p>
+        </p:txBody>
+      </p:sp>
+      <p:sp>
+        <p:nvSpPr>
+          <p:cNvPr id="37" name="PlaceHolder 7"/>
           <p:cNvSpPr>
             <a:spLocks noGrp="1"/>
           </p:cNvSpPr>
@@ -569,8 +531,8 @@
         </p:nvSpPr>
         <p:spPr>
           <a:xfrm>
-            <a:off x="7949160" y="4098240"/>
-            <a:ext cx="3385800" cy="2075040"/>
+            <a:off x="8029800" y="3682080"/>
+            <a:ext cx="3533040" cy="1896840"/>
           </a:xfrm>
           <a:prstGeom prst="rect">
             <a:avLst/>
@@ -581,11 +543,8 @@
             <a:normAutofit/>
           </a:bodyPr>
           <a:p>
-            <a:endParaRPr b="0" lang="de-DE" sz="2800" spc="-1" strike="noStrike">
-              <a:solidFill>
-                <a:srgbClr val="000000"/>
-              </a:solidFill>
-              <a:latin typeface="Calibri"/>
+            <a:endParaRPr b="0" lang="en-US" sz="3200" spc="-1" strike="noStrike">
+              <a:latin typeface="Arial"/>
             </a:endParaRPr>
           </a:p>
         </p:txBody>
@@ -636,7 +595,7 @@
       </p:grpSpPr>
       <p:sp>
         <p:nvSpPr>
-          <p:cNvPr id="46" name="PlaceHolder 1"/>
+          <p:cNvPr id="40" name="PlaceHolder 1"/>
           <p:cNvSpPr>
             <a:spLocks noGrp="1"/>
           </p:cNvSpPr>
@@ -646,8 +605,8 @@
         </p:nvSpPr>
         <p:spPr>
           <a:xfrm>
-            <a:off x="838080" y="365040"/>
-            <a:ext cx="10515240" cy="1325160"/>
+            <a:off x="609480" y="273600"/>
+            <a:ext cx="10972440" cy="1144800"/>
           </a:xfrm>
           <a:prstGeom prst="rect">
             <a:avLst/>
@@ -656,18 +615,16 @@
         <p:txBody>
           <a:bodyPr lIns="0" rIns="0" tIns="0" bIns="0" anchor="ctr"/>
           <a:p>
-            <a:endParaRPr b="0" lang="de-DE" sz="1800" spc="-1" strike="noStrike">
-              <a:solidFill>
-                <a:srgbClr val="000000"/>
-              </a:solidFill>
-              <a:latin typeface="Calibri"/>
-            </a:endParaRPr>
-          </a:p>
-        </p:txBody>
-      </p:sp>
-      <p:sp>
-        <p:nvSpPr>
-          <p:cNvPr id="47" name="PlaceHolder 2"/>
+            <a:pPr algn="ctr"/>
+            <a:endParaRPr b="0" lang="en-US" sz="4400" spc="-1" strike="noStrike">
+              <a:latin typeface="Arial"/>
+            </a:endParaRPr>
+          </a:p>
+        </p:txBody>
+      </p:sp>
+      <p:sp>
+        <p:nvSpPr>
+          <p:cNvPr id="41" name="PlaceHolder 2"/>
           <p:cNvSpPr>
             <a:spLocks noGrp="1"/>
           </p:cNvSpPr>
@@ -677,8 +634,8 @@
         </p:nvSpPr>
         <p:spPr>
           <a:xfrm>
-            <a:off x="838080" y="1825560"/>
-            <a:ext cx="10515240" cy="4350960"/>
+            <a:off x="609480" y="1604520"/>
+            <a:ext cx="10972440" cy="3977280"/>
           </a:xfrm>
           <a:prstGeom prst="rect">
             <a:avLst/>
@@ -718,7 +675,7 @@
       </p:grpSpPr>
       <p:sp>
         <p:nvSpPr>
-          <p:cNvPr id="48" name="PlaceHolder 1"/>
+          <p:cNvPr id="42" name="PlaceHolder 1"/>
           <p:cNvSpPr>
             <a:spLocks noGrp="1"/>
           </p:cNvSpPr>
@@ -728,8 +685,8 @@
         </p:nvSpPr>
         <p:spPr>
           <a:xfrm>
-            <a:off x="838080" y="365040"/>
-            <a:ext cx="10515240" cy="1325160"/>
+            <a:off x="609480" y="273600"/>
+            <a:ext cx="10972440" cy="1144800"/>
           </a:xfrm>
           <a:prstGeom prst="rect">
             <a:avLst/>
@@ -738,18 +695,16 @@
         <p:txBody>
           <a:bodyPr lIns="0" rIns="0" tIns="0" bIns="0" anchor="ctr"/>
           <a:p>
-            <a:endParaRPr b="0" lang="de-DE" sz="1800" spc="-1" strike="noStrike">
-              <a:solidFill>
-                <a:srgbClr val="000000"/>
-              </a:solidFill>
-              <a:latin typeface="Calibri"/>
-            </a:endParaRPr>
-          </a:p>
-        </p:txBody>
-      </p:sp>
-      <p:sp>
-        <p:nvSpPr>
-          <p:cNvPr id="49" name="PlaceHolder 2"/>
+            <a:pPr algn="ctr"/>
+            <a:endParaRPr b="0" lang="en-US" sz="4400" spc="-1" strike="noStrike">
+              <a:latin typeface="Arial"/>
+            </a:endParaRPr>
+          </a:p>
+        </p:txBody>
+      </p:sp>
+      <p:sp>
+        <p:nvSpPr>
+          <p:cNvPr id="43" name="PlaceHolder 2"/>
           <p:cNvSpPr>
             <a:spLocks noGrp="1"/>
           </p:cNvSpPr>
@@ -759,8 +714,8 @@
         </p:nvSpPr>
         <p:spPr>
           <a:xfrm>
-            <a:off x="838080" y="1825560"/>
-            <a:ext cx="10515240" cy="4350960"/>
+            <a:off x="609480" y="1604520"/>
+            <a:ext cx="10972440" cy="3977280"/>
           </a:xfrm>
           <a:prstGeom prst="rect">
             <a:avLst/>
@@ -771,11 +726,8 @@
             <a:normAutofit/>
           </a:bodyPr>
           <a:p>
-            <a:endParaRPr b="0" lang="de-DE" sz="2800" spc="-1" strike="noStrike">
-              <a:solidFill>
-                <a:srgbClr val="000000"/>
-              </a:solidFill>
-              <a:latin typeface="Calibri"/>
+            <a:endParaRPr b="0" lang="en-US" sz="3200" spc="-1" strike="noStrike">
+              <a:latin typeface="Arial"/>
             </a:endParaRPr>
           </a:p>
         </p:txBody>
@@ -804,7 +756,7 @@
       </p:grpSpPr>
       <p:sp>
         <p:nvSpPr>
-          <p:cNvPr id="50" name="PlaceHolder 1"/>
+          <p:cNvPr id="44" name="PlaceHolder 1"/>
           <p:cNvSpPr>
             <a:spLocks noGrp="1"/>
           </p:cNvSpPr>
@@ -814,8 +766,8 @@
         </p:nvSpPr>
         <p:spPr>
           <a:xfrm>
-            <a:off x="838080" y="365040"/>
-            <a:ext cx="10515240" cy="1325160"/>
+            <a:off x="609480" y="273600"/>
+            <a:ext cx="10972440" cy="1144800"/>
           </a:xfrm>
           <a:prstGeom prst="rect">
             <a:avLst/>
@@ -824,18 +776,16 @@
         <p:txBody>
           <a:bodyPr lIns="0" rIns="0" tIns="0" bIns="0" anchor="ctr"/>
           <a:p>
-            <a:endParaRPr b="0" lang="de-DE" sz="1800" spc="-1" strike="noStrike">
-              <a:solidFill>
-                <a:srgbClr val="000000"/>
-              </a:solidFill>
-              <a:latin typeface="Calibri"/>
-            </a:endParaRPr>
-          </a:p>
-        </p:txBody>
-      </p:sp>
-      <p:sp>
-        <p:nvSpPr>
-          <p:cNvPr id="51" name="PlaceHolder 2"/>
+            <a:pPr algn="ctr"/>
+            <a:endParaRPr b="0" lang="en-US" sz="4400" spc="-1" strike="noStrike">
+              <a:latin typeface="Arial"/>
+            </a:endParaRPr>
+          </a:p>
+        </p:txBody>
+      </p:sp>
+      <p:sp>
+        <p:nvSpPr>
+          <p:cNvPr id="45" name="PlaceHolder 2"/>
           <p:cNvSpPr>
             <a:spLocks noGrp="1"/>
           </p:cNvSpPr>
@@ -845,8 +795,8 @@
         </p:nvSpPr>
         <p:spPr>
           <a:xfrm>
-            <a:off x="838080" y="1825560"/>
-            <a:ext cx="5131080" cy="4350960"/>
+            <a:off x="609480" y="1604520"/>
+            <a:ext cx="5354280" cy="3977280"/>
           </a:xfrm>
           <a:prstGeom prst="rect">
             <a:avLst/>
@@ -857,18 +807,15 @@
             <a:normAutofit/>
           </a:bodyPr>
           <a:p>
-            <a:endParaRPr b="0" lang="de-DE" sz="2800" spc="-1" strike="noStrike">
-              <a:solidFill>
-                <a:srgbClr val="000000"/>
-              </a:solidFill>
-              <a:latin typeface="Calibri"/>
-            </a:endParaRPr>
-          </a:p>
-        </p:txBody>
-      </p:sp>
-      <p:sp>
-        <p:nvSpPr>
-          <p:cNvPr id="52" name="PlaceHolder 3"/>
+            <a:endParaRPr b="0" lang="en-US" sz="3200" spc="-1" strike="noStrike">
+              <a:latin typeface="Arial"/>
+            </a:endParaRPr>
+          </a:p>
+        </p:txBody>
+      </p:sp>
+      <p:sp>
+        <p:nvSpPr>
+          <p:cNvPr id="46" name="PlaceHolder 3"/>
           <p:cNvSpPr>
             <a:spLocks noGrp="1"/>
           </p:cNvSpPr>
@@ -878,8 +825,8 @@
         </p:nvSpPr>
         <p:spPr>
           <a:xfrm>
-            <a:off x="6226200" y="1825560"/>
-            <a:ext cx="5131080" cy="4350960"/>
+            <a:off x="6231960" y="1604520"/>
+            <a:ext cx="5354280" cy="3977280"/>
           </a:xfrm>
           <a:prstGeom prst="rect">
             <a:avLst/>
@@ -890,11 +837,8 @@
             <a:normAutofit/>
           </a:bodyPr>
           <a:p>
-            <a:endParaRPr b="0" lang="de-DE" sz="2800" spc="-1" strike="noStrike">
-              <a:solidFill>
-                <a:srgbClr val="000000"/>
-              </a:solidFill>
-              <a:latin typeface="Calibri"/>
+            <a:endParaRPr b="0" lang="en-US" sz="3200" spc="-1" strike="noStrike">
+              <a:latin typeface="Arial"/>
             </a:endParaRPr>
           </a:p>
         </p:txBody>
@@ -923,7 +867,7 @@
       </p:grpSpPr>
       <p:sp>
         <p:nvSpPr>
-          <p:cNvPr id="53" name="PlaceHolder 1"/>
+          <p:cNvPr id="47" name="PlaceHolder 1"/>
           <p:cNvSpPr>
             <a:spLocks noGrp="1"/>
           </p:cNvSpPr>
@@ -933,8 +877,8 @@
         </p:nvSpPr>
         <p:spPr>
           <a:xfrm>
-            <a:off x="838080" y="365040"/>
-            <a:ext cx="10515240" cy="1325160"/>
+            <a:off x="609480" y="273600"/>
+            <a:ext cx="10972440" cy="1144800"/>
           </a:xfrm>
           <a:prstGeom prst="rect">
             <a:avLst/>
@@ -943,11 +887,9 @@
         <p:txBody>
           <a:bodyPr lIns="0" rIns="0" tIns="0" bIns="0" anchor="ctr"/>
           <a:p>
-            <a:endParaRPr b="0" lang="de-DE" sz="1800" spc="-1" strike="noStrike">
-              <a:solidFill>
-                <a:srgbClr val="000000"/>
-              </a:solidFill>
-              <a:latin typeface="Calibri"/>
+            <a:pPr algn="ctr"/>
+            <a:endParaRPr b="0" lang="en-US" sz="4400" spc="-1" strike="noStrike">
+              <a:latin typeface="Arial"/>
             </a:endParaRPr>
           </a:p>
         </p:txBody>
@@ -976,7 +918,7 @@
       </p:grpSpPr>
       <p:sp>
         <p:nvSpPr>
-          <p:cNvPr id="54" name="PlaceHolder 1"/>
+          <p:cNvPr id="48" name="PlaceHolder 1"/>
           <p:cNvSpPr>
             <a:spLocks noGrp="1"/>
           </p:cNvSpPr>
@@ -986,8 +928,8 @@
         </p:nvSpPr>
         <p:spPr>
           <a:xfrm>
-            <a:off x="838080" y="365040"/>
-            <a:ext cx="10515240" cy="6144120"/>
+            <a:off x="609480" y="273600"/>
+            <a:ext cx="10972440" cy="5307840"/>
           </a:xfrm>
           <a:prstGeom prst="rect">
             <a:avLst/>
@@ -1027,7 +969,7 @@
       </p:grpSpPr>
       <p:sp>
         <p:nvSpPr>
-          <p:cNvPr id="55" name="PlaceHolder 1"/>
+          <p:cNvPr id="49" name="PlaceHolder 1"/>
           <p:cNvSpPr>
             <a:spLocks noGrp="1"/>
           </p:cNvSpPr>
@@ -1037,8 +979,8 @@
         </p:nvSpPr>
         <p:spPr>
           <a:xfrm>
-            <a:off x="838080" y="365040"/>
-            <a:ext cx="10515240" cy="1325160"/>
+            <a:off x="609480" y="273600"/>
+            <a:ext cx="10972440" cy="1144800"/>
           </a:xfrm>
           <a:prstGeom prst="rect">
             <a:avLst/>
@@ -1047,18 +989,16 @@
         <p:txBody>
           <a:bodyPr lIns="0" rIns="0" tIns="0" bIns="0" anchor="ctr"/>
           <a:p>
-            <a:endParaRPr b="0" lang="de-DE" sz="1800" spc="-1" strike="noStrike">
-              <a:solidFill>
-                <a:srgbClr val="000000"/>
-              </a:solidFill>
-              <a:latin typeface="Calibri"/>
-            </a:endParaRPr>
-          </a:p>
-        </p:txBody>
-      </p:sp>
-      <p:sp>
-        <p:nvSpPr>
-          <p:cNvPr id="56" name="PlaceHolder 2"/>
+            <a:pPr algn="ctr"/>
+            <a:endParaRPr b="0" lang="en-US" sz="4400" spc="-1" strike="noStrike">
+              <a:latin typeface="Arial"/>
+            </a:endParaRPr>
+          </a:p>
+        </p:txBody>
+      </p:sp>
+      <p:sp>
+        <p:nvSpPr>
+          <p:cNvPr id="50" name="PlaceHolder 2"/>
           <p:cNvSpPr>
             <a:spLocks noGrp="1"/>
           </p:cNvSpPr>
@@ -1068,8 +1008,8 @@
         </p:nvSpPr>
         <p:spPr>
           <a:xfrm>
-            <a:off x="838080" y="1825560"/>
-            <a:ext cx="5131080" cy="2075040"/>
+            <a:off x="609480" y="1604520"/>
+            <a:ext cx="5354280" cy="1896840"/>
           </a:xfrm>
           <a:prstGeom prst="rect">
             <a:avLst/>
@@ -1080,18 +1020,15 @@
             <a:normAutofit/>
           </a:bodyPr>
           <a:p>
-            <a:endParaRPr b="0" lang="de-DE" sz="2800" spc="-1" strike="noStrike">
-              <a:solidFill>
-                <a:srgbClr val="000000"/>
-              </a:solidFill>
-              <a:latin typeface="Calibri"/>
-            </a:endParaRPr>
-          </a:p>
-        </p:txBody>
-      </p:sp>
-      <p:sp>
-        <p:nvSpPr>
-          <p:cNvPr id="57" name="PlaceHolder 3"/>
+            <a:endParaRPr b="0" lang="en-US" sz="3200" spc="-1" strike="noStrike">
+              <a:latin typeface="Arial"/>
+            </a:endParaRPr>
+          </a:p>
+        </p:txBody>
+      </p:sp>
+      <p:sp>
+        <p:nvSpPr>
+          <p:cNvPr id="51" name="PlaceHolder 3"/>
           <p:cNvSpPr>
             <a:spLocks noGrp="1"/>
           </p:cNvSpPr>
@@ -1101,8 +1038,8 @@
         </p:nvSpPr>
         <p:spPr>
           <a:xfrm>
-            <a:off x="6226200" y="1825560"/>
-            <a:ext cx="5131080" cy="4350960"/>
+            <a:off x="6231960" y="1604520"/>
+            <a:ext cx="5354280" cy="3977280"/>
           </a:xfrm>
           <a:prstGeom prst="rect">
             <a:avLst/>
@@ -1113,18 +1050,15 @@
             <a:normAutofit/>
           </a:bodyPr>
           <a:p>
-            <a:endParaRPr b="0" lang="de-DE" sz="2800" spc="-1" strike="noStrike">
-              <a:solidFill>
-                <a:srgbClr val="000000"/>
-              </a:solidFill>
-              <a:latin typeface="Calibri"/>
-            </a:endParaRPr>
-          </a:p>
-        </p:txBody>
-      </p:sp>
-      <p:sp>
-        <p:nvSpPr>
-          <p:cNvPr id="58" name="PlaceHolder 4"/>
+            <a:endParaRPr b="0" lang="en-US" sz="3200" spc="-1" strike="noStrike">
+              <a:latin typeface="Arial"/>
+            </a:endParaRPr>
+          </a:p>
+        </p:txBody>
+      </p:sp>
+      <p:sp>
+        <p:nvSpPr>
+          <p:cNvPr id="52" name="PlaceHolder 4"/>
           <p:cNvSpPr>
             <a:spLocks noGrp="1"/>
           </p:cNvSpPr>
@@ -1134,8 +1068,8 @@
         </p:nvSpPr>
         <p:spPr>
           <a:xfrm>
-            <a:off x="838080" y="4098240"/>
-            <a:ext cx="5131080" cy="2075040"/>
+            <a:off x="609480" y="3682080"/>
+            <a:ext cx="5354280" cy="1896840"/>
           </a:xfrm>
           <a:prstGeom prst="rect">
             <a:avLst/>
@@ -1146,11 +1080,8 @@
             <a:normAutofit/>
           </a:bodyPr>
           <a:p>
-            <a:endParaRPr b="0" lang="de-DE" sz="2800" spc="-1" strike="noStrike">
-              <a:solidFill>
-                <a:srgbClr val="000000"/>
-              </a:solidFill>
-              <a:latin typeface="Calibri"/>
+            <a:endParaRPr b="0" lang="en-US" sz="3200" spc="-1" strike="noStrike">
+              <a:latin typeface="Arial"/>
             </a:endParaRPr>
           </a:p>
         </p:txBody>
@@ -1179,7 +1110,7 @@
       </p:grpSpPr>
       <p:sp>
         <p:nvSpPr>
-          <p:cNvPr id="5" name="PlaceHolder 1"/>
+          <p:cNvPr id="2" name="PlaceHolder 1"/>
           <p:cNvSpPr>
             <a:spLocks noGrp="1"/>
           </p:cNvSpPr>
@@ -1189,8 +1120,8 @@
         </p:nvSpPr>
         <p:spPr>
           <a:xfrm>
-            <a:off x="838080" y="365040"/>
-            <a:ext cx="10515240" cy="1325160"/>
+            <a:off x="609480" y="273600"/>
+            <a:ext cx="10972440" cy="1144800"/>
           </a:xfrm>
           <a:prstGeom prst="rect">
             <a:avLst/>
@@ -1199,18 +1130,16 @@
         <p:txBody>
           <a:bodyPr lIns="0" rIns="0" tIns="0" bIns="0" anchor="ctr"/>
           <a:p>
-            <a:endParaRPr b="0" lang="de-DE" sz="1800" spc="-1" strike="noStrike">
-              <a:solidFill>
-                <a:srgbClr val="000000"/>
-              </a:solidFill>
-              <a:latin typeface="Calibri"/>
-            </a:endParaRPr>
-          </a:p>
-        </p:txBody>
-      </p:sp>
-      <p:sp>
-        <p:nvSpPr>
-          <p:cNvPr id="6" name="PlaceHolder 2"/>
+            <a:pPr algn="ctr"/>
+            <a:endParaRPr b="0" lang="en-US" sz="4400" spc="-1" strike="noStrike">
+              <a:latin typeface="Arial"/>
+            </a:endParaRPr>
+          </a:p>
+        </p:txBody>
+      </p:sp>
+      <p:sp>
+        <p:nvSpPr>
+          <p:cNvPr id="3" name="PlaceHolder 2"/>
           <p:cNvSpPr>
             <a:spLocks noGrp="1"/>
           </p:cNvSpPr>
@@ -1220,8 +1149,8 @@
         </p:nvSpPr>
         <p:spPr>
           <a:xfrm>
-            <a:off x="838080" y="1825560"/>
-            <a:ext cx="10515240" cy="4350960"/>
+            <a:off x="609480" y="1604520"/>
+            <a:ext cx="10972440" cy="3977280"/>
           </a:xfrm>
           <a:prstGeom prst="rect">
             <a:avLst/>
@@ -1261,7 +1190,7 @@
       </p:grpSpPr>
       <p:sp>
         <p:nvSpPr>
-          <p:cNvPr id="59" name="PlaceHolder 1"/>
+          <p:cNvPr id="53" name="PlaceHolder 1"/>
           <p:cNvSpPr>
             <a:spLocks noGrp="1"/>
           </p:cNvSpPr>
@@ -1271,8 +1200,8 @@
         </p:nvSpPr>
         <p:spPr>
           <a:xfrm>
-            <a:off x="838080" y="365040"/>
-            <a:ext cx="10515240" cy="1325160"/>
+            <a:off x="609480" y="273600"/>
+            <a:ext cx="10972440" cy="1144800"/>
           </a:xfrm>
           <a:prstGeom prst="rect">
             <a:avLst/>
@@ -1281,18 +1210,16 @@
         <p:txBody>
           <a:bodyPr lIns="0" rIns="0" tIns="0" bIns="0" anchor="ctr"/>
           <a:p>
-            <a:endParaRPr b="0" lang="de-DE" sz="1800" spc="-1" strike="noStrike">
-              <a:solidFill>
-                <a:srgbClr val="000000"/>
-              </a:solidFill>
-              <a:latin typeface="Calibri"/>
-            </a:endParaRPr>
-          </a:p>
-        </p:txBody>
-      </p:sp>
-      <p:sp>
-        <p:nvSpPr>
-          <p:cNvPr id="60" name="PlaceHolder 2"/>
+            <a:pPr algn="ctr"/>
+            <a:endParaRPr b="0" lang="en-US" sz="4400" spc="-1" strike="noStrike">
+              <a:latin typeface="Arial"/>
+            </a:endParaRPr>
+          </a:p>
+        </p:txBody>
+      </p:sp>
+      <p:sp>
+        <p:nvSpPr>
+          <p:cNvPr id="54" name="PlaceHolder 2"/>
           <p:cNvSpPr>
             <a:spLocks noGrp="1"/>
           </p:cNvSpPr>
@@ -1302,8 +1229,8 @@
         </p:nvSpPr>
         <p:spPr>
           <a:xfrm>
-            <a:off x="838080" y="1825560"/>
-            <a:ext cx="5131080" cy="4350960"/>
+            <a:off x="609480" y="1604520"/>
+            <a:ext cx="5354280" cy="3977280"/>
           </a:xfrm>
           <a:prstGeom prst="rect">
             <a:avLst/>
@@ -1314,18 +1241,15 @@
             <a:normAutofit/>
           </a:bodyPr>
           <a:p>
-            <a:endParaRPr b="0" lang="de-DE" sz="2800" spc="-1" strike="noStrike">
-              <a:solidFill>
-                <a:srgbClr val="000000"/>
-              </a:solidFill>
-              <a:latin typeface="Calibri"/>
-            </a:endParaRPr>
-          </a:p>
-        </p:txBody>
-      </p:sp>
-      <p:sp>
-        <p:nvSpPr>
-          <p:cNvPr id="61" name="PlaceHolder 3"/>
+            <a:endParaRPr b="0" lang="en-US" sz="3200" spc="-1" strike="noStrike">
+              <a:latin typeface="Arial"/>
+            </a:endParaRPr>
+          </a:p>
+        </p:txBody>
+      </p:sp>
+      <p:sp>
+        <p:nvSpPr>
+          <p:cNvPr id="55" name="PlaceHolder 3"/>
           <p:cNvSpPr>
             <a:spLocks noGrp="1"/>
           </p:cNvSpPr>
@@ -1335,8 +1259,8 @@
         </p:nvSpPr>
         <p:spPr>
           <a:xfrm>
-            <a:off x="6226200" y="1825560"/>
-            <a:ext cx="5131080" cy="2075040"/>
+            <a:off x="6231960" y="1604520"/>
+            <a:ext cx="5354280" cy="1896840"/>
           </a:xfrm>
           <a:prstGeom prst="rect">
             <a:avLst/>
@@ -1347,18 +1271,15 @@
             <a:normAutofit/>
           </a:bodyPr>
           <a:p>
-            <a:endParaRPr b="0" lang="de-DE" sz="2800" spc="-1" strike="noStrike">
-              <a:solidFill>
-                <a:srgbClr val="000000"/>
-              </a:solidFill>
-              <a:latin typeface="Calibri"/>
-            </a:endParaRPr>
-          </a:p>
-        </p:txBody>
-      </p:sp>
-      <p:sp>
-        <p:nvSpPr>
-          <p:cNvPr id="62" name="PlaceHolder 4"/>
+            <a:endParaRPr b="0" lang="en-US" sz="3200" spc="-1" strike="noStrike">
+              <a:latin typeface="Arial"/>
+            </a:endParaRPr>
+          </a:p>
+        </p:txBody>
+      </p:sp>
+      <p:sp>
+        <p:nvSpPr>
+          <p:cNvPr id="56" name="PlaceHolder 4"/>
           <p:cNvSpPr>
             <a:spLocks noGrp="1"/>
           </p:cNvSpPr>
@@ -1368,8 +1289,8 @@
         </p:nvSpPr>
         <p:spPr>
           <a:xfrm>
-            <a:off x="6226200" y="4098240"/>
-            <a:ext cx="5131080" cy="2075040"/>
+            <a:off x="6231960" y="3682080"/>
+            <a:ext cx="5354280" cy="1896840"/>
           </a:xfrm>
           <a:prstGeom prst="rect">
             <a:avLst/>
@@ -1380,11 +1301,8 @@
             <a:normAutofit/>
           </a:bodyPr>
           <a:p>
-            <a:endParaRPr b="0" lang="de-DE" sz="2800" spc="-1" strike="noStrike">
-              <a:solidFill>
-                <a:srgbClr val="000000"/>
-              </a:solidFill>
-              <a:latin typeface="Calibri"/>
+            <a:endParaRPr b="0" lang="en-US" sz="3200" spc="-1" strike="noStrike">
+              <a:latin typeface="Arial"/>
             </a:endParaRPr>
           </a:p>
         </p:txBody>
@@ -1413,7 +1331,7 @@
       </p:grpSpPr>
       <p:sp>
         <p:nvSpPr>
-          <p:cNvPr id="63" name="PlaceHolder 1"/>
+          <p:cNvPr id="57" name="PlaceHolder 1"/>
           <p:cNvSpPr>
             <a:spLocks noGrp="1"/>
           </p:cNvSpPr>
@@ -1423,8 +1341,8 @@
         </p:nvSpPr>
         <p:spPr>
           <a:xfrm>
-            <a:off x="838080" y="365040"/>
-            <a:ext cx="10515240" cy="1325160"/>
+            <a:off x="609480" y="273600"/>
+            <a:ext cx="10972440" cy="1144800"/>
           </a:xfrm>
           <a:prstGeom prst="rect">
             <a:avLst/>
@@ -1433,18 +1351,16 @@
         <p:txBody>
           <a:bodyPr lIns="0" rIns="0" tIns="0" bIns="0" anchor="ctr"/>
           <a:p>
-            <a:endParaRPr b="0" lang="de-DE" sz="1800" spc="-1" strike="noStrike">
-              <a:solidFill>
-                <a:srgbClr val="000000"/>
-              </a:solidFill>
-              <a:latin typeface="Calibri"/>
-            </a:endParaRPr>
-          </a:p>
-        </p:txBody>
-      </p:sp>
-      <p:sp>
-        <p:nvSpPr>
-          <p:cNvPr id="64" name="PlaceHolder 2"/>
+            <a:pPr algn="ctr"/>
+            <a:endParaRPr b="0" lang="en-US" sz="4400" spc="-1" strike="noStrike">
+              <a:latin typeface="Arial"/>
+            </a:endParaRPr>
+          </a:p>
+        </p:txBody>
+      </p:sp>
+      <p:sp>
+        <p:nvSpPr>
+          <p:cNvPr id="58" name="PlaceHolder 2"/>
           <p:cNvSpPr>
             <a:spLocks noGrp="1"/>
           </p:cNvSpPr>
@@ -1454,8 +1370,8 @@
         </p:nvSpPr>
         <p:spPr>
           <a:xfrm>
-            <a:off x="838080" y="1825560"/>
-            <a:ext cx="5131080" cy="2075040"/>
+            <a:off x="609480" y="1604520"/>
+            <a:ext cx="5354280" cy="1896840"/>
           </a:xfrm>
           <a:prstGeom prst="rect">
             <a:avLst/>
@@ -1466,18 +1382,15 @@
             <a:normAutofit/>
           </a:bodyPr>
           <a:p>
-            <a:endParaRPr b="0" lang="de-DE" sz="2800" spc="-1" strike="noStrike">
-              <a:solidFill>
-                <a:srgbClr val="000000"/>
-              </a:solidFill>
-              <a:latin typeface="Calibri"/>
-            </a:endParaRPr>
-          </a:p>
-        </p:txBody>
-      </p:sp>
-      <p:sp>
-        <p:nvSpPr>
-          <p:cNvPr id="65" name="PlaceHolder 3"/>
+            <a:endParaRPr b="0" lang="en-US" sz="3200" spc="-1" strike="noStrike">
+              <a:latin typeface="Arial"/>
+            </a:endParaRPr>
+          </a:p>
+        </p:txBody>
+      </p:sp>
+      <p:sp>
+        <p:nvSpPr>
+          <p:cNvPr id="59" name="PlaceHolder 3"/>
           <p:cNvSpPr>
             <a:spLocks noGrp="1"/>
           </p:cNvSpPr>
@@ -1487,8 +1400,8 @@
         </p:nvSpPr>
         <p:spPr>
           <a:xfrm>
-            <a:off x="6226200" y="1825560"/>
-            <a:ext cx="5131080" cy="2075040"/>
+            <a:off x="6231960" y="1604520"/>
+            <a:ext cx="5354280" cy="1896840"/>
           </a:xfrm>
           <a:prstGeom prst="rect">
             <a:avLst/>
@@ -1499,18 +1412,15 @@
             <a:normAutofit/>
           </a:bodyPr>
           <a:p>
-            <a:endParaRPr b="0" lang="de-DE" sz="2800" spc="-1" strike="noStrike">
-              <a:solidFill>
-                <a:srgbClr val="000000"/>
-              </a:solidFill>
-              <a:latin typeface="Calibri"/>
-            </a:endParaRPr>
-          </a:p>
-        </p:txBody>
-      </p:sp>
-      <p:sp>
-        <p:nvSpPr>
-          <p:cNvPr id="66" name="PlaceHolder 4"/>
+            <a:endParaRPr b="0" lang="en-US" sz="3200" spc="-1" strike="noStrike">
+              <a:latin typeface="Arial"/>
+            </a:endParaRPr>
+          </a:p>
+        </p:txBody>
+      </p:sp>
+      <p:sp>
+        <p:nvSpPr>
+          <p:cNvPr id="60" name="PlaceHolder 4"/>
           <p:cNvSpPr>
             <a:spLocks noGrp="1"/>
           </p:cNvSpPr>
@@ -1520,8 +1430,8 @@
         </p:nvSpPr>
         <p:spPr>
           <a:xfrm>
-            <a:off x="838080" y="4098240"/>
-            <a:ext cx="10515240" cy="2075040"/>
+            <a:off x="609480" y="3682080"/>
+            <a:ext cx="10972440" cy="1896840"/>
           </a:xfrm>
           <a:prstGeom prst="rect">
             <a:avLst/>
@@ -1532,11 +1442,8 @@
             <a:normAutofit/>
           </a:bodyPr>
           <a:p>
-            <a:endParaRPr b="0" lang="de-DE" sz="2800" spc="-1" strike="noStrike">
-              <a:solidFill>
-                <a:srgbClr val="000000"/>
-              </a:solidFill>
-              <a:latin typeface="Calibri"/>
+            <a:endParaRPr b="0" lang="en-US" sz="3200" spc="-1" strike="noStrike">
+              <a:latin typeface="Arial"/>
             </a:endParaRPr>
           </a:p>
         </p:txBody>
@@ -1565,7 +1472,7 @@
       </p:grpSpPr>
       <p:sp>
         <p:nvSpPr>
-          <p:cNvPr id="67" name="PlaceHolder 1"/>
+          <p:cNvPr id="61" name="PlaceHolder 1"/>
           <p:cNvSpPr>
             <a:spLocks noGrp="1"/>
           </p:cNvSpPr>
@@ -1575,8 +1482,8 @@
         </p:nvSpPr>
         <p:spPr>
           <a:xfrm>
-            <a:off x="838080" y="365040"/>
-            <a:ext cx="10515240" cy="1325160"/>
+            <a:off x="609480" y="273600"/>
+            <a:ext cx="10972440" cy="1144800"/>
           </a:xfrm>
           <a:prstGeom prst="rect">
             <a:avLst/>
@@ -1585,18 +1492,16 @@
         <p:txBody>
           <a:bodyPr lIns="0" rIns="0" tIns="0" bIns="0" anchor="ctr"/>
           <a:p>
-            <a:endParaRPr b="0" lang="de-DE" sz="1800" spc="-1" strike="noStrike">
-              <a:solidFill>
-                <a:srgbClr val="000000"/>
-              </a:solidFill>
-              <a:latin typeface="Calibri"/>
-            </a:endParaRPr>
-          </a:p>
-        </p:txBody>
-      </p:sp>
-      <p:sp>
-        <p:nvSpPr>
-          <p:cNvPr id="68" name="PlaceHolder 2"/>
+            <a:pPr algn="ctr"/>
+            <a:endParaRPr b="0" lang="en-US" sz="4400" spc="-1" strike="noStrike">
+              <a:latin typeface="Arial"/>
+            </a:endParaRPr>
+          </a:p>
+        </p:txBody>
+      </p:sp>
+      <p:sp>
+        <p:nvSpPr>
+          <p:cNvPr id="62" name="PlaceHolder 2"/>
           <p:cNvSpPr>
             <a:spLocks noGrp="1"/>
           </p:cNvSpPr>
@@ -1606,8 +1511,8 @@
         </p:nvSpPr>
         <p:spPr>
           <a:xfrm>
-            <a:off x="838080" y="1825560"/>
-            <a:ext cx="10515240" cy="2075040"/>
+            <a:off x="609480" y="1604520"/>
+            <a:ext cx="10972440" cy="1896840"/>
           </a:xfrm>
           <a:prstGeom prst="rect">
             <a:avLst/>
@@ -1618,18 +1523,15 @@
             <a:normAutofit/>
           </a:bodyPr>
           <a:p>
-            <a:endParaRPr b="0" lang="de-DE" sz="2800" spc="-1" strike="noStrike">
-              <a:solidFill>
-                <a:srgbClr val="000000"/>
-              </a:solidFill>
-              <a:latin typeface="Calibri"/>
-            </a:endParaRPr>
-          </a:p>
-        </p:txBody>
-      </p:sp>
-      <p:sp>
-        <p:nvSpPr>
-          <p:cNvPr id="69" name="PlaceHolder 3"/>
+            <a:endParaRPr b="0" lang="en-US" sz="3200" spc="-1" strike="noStrike">
+              <a:latin typeface="Arial"/>
+            </a:endParaRPr>
+          </a:p>
+        </p:txBody>
+      </p:sp>
+      <p:sp>
+        <p:nvSpPr>
+          <p:cNvPr id="63" name="PlaceHolder 3"/>
           <p:cNvSpPr>
             <a:spLocks noGrp="1"/>
           </p:cNvSpPr>
@@ -1639,8 +1541,8 @@
         </p:nvSpPr>
         <p:spPr>
           <a:xfrm>
-            <a:off x="838080" y="4098240"/>
-            <a:ext cx="10515240" cy="2075040"/>
+            <a:off x="609480" y="3682080"/>
+            <a:ext cx="10972440" cy="1896840"/>
           </a:xfrm>
           <a:prstGeom prst="rect">
             <a:avLst/>
@@ -1651,11 +1553,8 @@
             <a:normAutofit/>
           </a:bodyPr>
           <a:p>
-            <a:endParaRPr b="0" lang="de-DE" sz="2800" spc="-1" strike="noStrike">
-              <a:solidFill>
-                <a:srgbClr val="000000"/>
-              </a:solidFill>
-              <a:latin typeface="Calibri"/>
+            <a:endParaRPr b="0" lang="en-US" sz="3200" spc="-1" strike="noStrike">
+              <a:latin typeface="Arial"/>
             </a:endParaRPr>
           </a:p>
         </p:txBody>
@@ -1684,7 +1583,7 @@
       </p:grpSpPr>
       <p:sp>
         <p:nvSpPr>
-          <p:cNvPr id="70" name="PlaceHolder 1"/>
+          <p:cNvPr id="64" name="PlaceHolder 1"/>
           <p:cNvSpPr>
             <a:spLocks noGrp="1"/>
           </p:cNvSpPr>
@@ -1694,8 +1593,8 @@
         </p:nvSpPr>
         <p:spPr>
           <a:xfrm>
-            <a:off x="838080" y="365040"/>
-            <a:ext cx="10515240" cy="1325160"/>
+            <a:off x="609480" y="273600"/>
+            <a:ext cx="10972440" cy="1144800"/>
           </a:xfrm>
           <a:prstGeom prst="rect">
             <a:avLst/>
@@ -1704,18 +1603,16 @@
         <p:txBody>
           <a:bodyPr lIns="0" rIns="0" tIns="0" bIns="0" anchor="ctr"/>
           <a:p>
-            <a:endParaRPr b="0" lang="de-DE" sz="1800" spc="-1" strike="noStrike">
-              <a:solidFill>
-                <a:srgbClr val="000000"/>
-              </a:solidFill>
-              <a:latin typeface="Calibri"/>
-            </a:endParaRPr>
-          </a:p>
-        </p:txBody>
-      </p:sp>
-      <p:sp>
-        <p:nvSpPr>
-          <p:cNvPr id="71" name="PlaceHolder 2"/>
+            <a:pPr algn="ctr"/>
+            <a:endParaRPr b="0" lang="en-US" sz="4400" spc="-1" strike="noStrike">
+              <a:latin typeface="Arial"/>
+            </a:endParaRPr>
+          </a:p>
+        </p:txBody>
+      </p:sp>
+      <p:sp>
+        <p:nvSpPr>
+          <p:cNvPr id="65" name="PlaceHolder 2"/>
           <p:cNvSpPr>
             <a:spLocks noGrp="1"/>
           </p:cNvSpPr>
@@ -1725,8 +1622,8 @@
         </p:nvSpPr>
         <p:spPr>
           <a:xfrm>
-            <a:off x="838080" y="1825560"/>
-            <a:ext cx="5131080" cy="2075040"/>
+            <a:off x="609480" y="1604520"/>
+            <a:ext cx="5354280" cy="1896840"/>
           </a:xfrm>
           <a:prstGeom prst="rect">
             <a:avLst/>
@@ -1737,18 +1634,15 @@
             <a:normAutofit/>
           </a:bodyPr>
           <a:p>
-            <a:endParaRPr b="0" lang="de-DE" sz="2800" spc="-1" strike="noStrike">
-              <a:solidFill>
-                <a:srgbClr val="000000"/>
-              </a:solidFill>
-              <a:latin typeface="Calibri"/>
-            </a:endParaRPr>
-          </a:p>
-        </p:txBody>
-      </p:sp>
-      <p:sp>
-        <p:nvSpPr>
-          <p:cNvPr id="72" name="PlaceHolder 3"/>
+            <a:endParaRPr b="0" lang="en-US" sz="3200" spc="-1" strike="noStrike">
+              <a:latin typeface="Arial"/>
+            </a:endParaRPr>
+          </a:p>
+        </p:txBody>
+      </p:sp>
+      <p:sp>
+        <p:nvSpPr>
+          <p:cNvPr id="66" name="PlaceHolder 3"/>
           <p:cNvSpPr>
             <a:spLocks noGrp="1"/>
           </p:cNvSpPr>
@@ -1758,8 +1652,8 @@
         </p:nvSpPr>
         <p:spPr>
           <a:xfrm>
-            <a:off x="6226200" y="1825560"/>
-            <a:ext cx="5131080" cy="2075040"/>
+            <a:off x="6231960" y="1604520"/>
+            <a:ext cx="5354280" cy="1896840"/>
           </a:xfrm>
           <a:prstGeom prst="rect">
             <a:avLst/>
@@ -1770,18 +1664,15 @@
             <a:normAutofit/>
           </a:bodyPr>
           <a:p>
-            <a:endParaRPr b="0" lang="de-DE" sz="2800" spc="-1" strike="noStrike">
-              <a:solidFill>
-                <a:srgbClr val="000000"/>
-              </a:solidFill>
-              <a:latin typeface="Calibri"/>
-            </a:endParaRPr>
-          </a:p>
-        </p:txBody>
-      </p:sp>
-      <p:sp>
-        <p:nvSpPr>
-          <p:cNvPr id="73" name="PlaceHolder 4"/>
+            <a:endParaRPr b="0" lang="en-US" sz="3200" spc="-1" strike="noStrike">
+              <a:latin typeface="Arial"/>
+            </a:endParaRPr>
+          </a:p>
+        </p:txBody>
+      </p:sp>
+      <p:sp>
+        <p:nvSpPr>
+          <p:cNvPr id="67" name="PlaceHolder 4"/>
           <p:cNvSpPr>
             <a:spLocks noGrp="1"/>
           </p:cNvSpPr>
@@ -1791,8 +1682,8 @@
         </p:nvSpPr>
         <p:spPr>
           <a:xfrm>
-            <a:off x="838080" y="4098240"/>
-            <a:ext cx="5131080" cy="2075040"/>
+            <a:off x="609480" y="3682080"/>
+            <a:ext cx="5354280" cy="1896840"/>
           </a:xfrm>
           <a:prstGeom prst="rect">
             <a:avLst/>
@@ -1803,18 +1694,15 @@
             <a:normAutofit/>
           </a:bodyPr>
           <a:p>
-            <a:endParaRPr b="0" lang="de-DE" sz="2800" spc="-1" strike="noStrike">
-              <a:solidFill>
-                <a:srgbClr val="000000"/>
-              </a:solidFill>
-              <a:latin typeface="Calibri"/>
-            </a:endParaRPr>
-          </a:p>
-        </p:txBody>
-      </p:sp>
-      <p:sp>
-        <p:nvSpPr>
-          <p:cNvPr id="74" name="PlaceHolder 5"/>
+            <a:endParaRPr b="0" lang="en-US" sz="3200" spc="-1" strike="noStrike">
+              <a:latin typeface="Arial"/>
+            </a:endParaRPr>
+          </a:p>
+        </p:txBody>
+      </p:sp>
+      <p:sp>
+        <p:nvSpPr>
+          <p:cNvPr id="68" name="PlaceHolder 5"/>
           <p:cNvSpPr>
             <a:spLocks noGrp="1"/>
           </p:cNvSpPr>
@@ -1824,8 +1712,8 @@
         </p:nvSpPr>
         <p:spPr>
           <a:xfrm>
-            <a:off x="6226200" y="4098240"/>
-            <a:ext cx="5131080" cy="2075040"/>
+            <a:off x="6231960" y="3682080"/>
+            <a:ext cx="5354280" cy="1896840"/>
           </a:xfrm>
           <a:prstGeom prst="rect">
             <a:avLst/>
@@ -1836,11 +1724,8 @@
             <a:normAutofit/>
           </a:bodyPr>
           <a:p>
-            <a:endParaRPr b="0" lang="de-DE" sz="2800" spc="-1" strike="noStrike">
-              <a:solidFill>
-                <a:srgbClr val="000000"/>
-              </a:solidFill>
-              <a:latin typeface="Calibri"/>
+            <a:endParaRPr b="0" lang="en-US" sz="3200" spc="-1" strike="noStrike">
+              <a:latin typeface="Arial"/>
             </a:endParaRPr>
           </a:p>
         </p:txBody>
@@ -1869,7 +1754,7 @@
       </p:grpSpPr>
       <p:sp>
         <p:nvSpPr>
-          <p:cNvPr id="75" name="PlaceHolder 1"/>
+          <p:cNvPr id="69" name="PlaceHolder 1"/>
           <p:cNvSpPr>
             <a:spLocks noGrp="1"/>
           </p:cNvSpPr>
@@ -1879,8 +1764,8 @@
         </p:nvSpPr>
         <p:spPr>
           <a:xfrm>
-            <a:off x="838080" y="365040"/>
-            <a:ext cx="10515240" cy="1325160"/>
+            <a:off x="609480" y="273600"/>
+            <a:ext cx="10972440" cy="1144800"/>
           </a:xfrm>
           <a:prstGeom prst="rect">
             <a:avLst/>
@@ -1889,18 +1774,16 @@
         <p:txBody>
           <a:bodyPr lIns="0" rIns="0" tIns="0" bIns="0" anchor="ctr"/>
           <a:p>
-            <a:endParaRPr b="0" lang="de-DE" sz="1800" spc="-1" strike="noStrike">
-              <a:solidFill>
-                <a:srgbClr val="000000"/>
-              </a:solidFill>
-              <a:latin typeface="Calibri"/>
-            </a:endParaRPr>
-          </a:p>
-        </p:txBody>
-      </p:sp>
-      <p:sp>
-        <p:nvSpPr>
-          <p:cNvPr id="76" name="PlaceHolder 2"/>
+            <a:pPr algn="ctr"/>
+            <a:endParaRPr b="0" lang="en-US" sz="4400" spc="-1" strike="noStrike">
+              <a:latin typeface="Arial"/>
+            </a:endParaRPr>
+          </a:p>
+        </p:txBody>
+      </p:sp>
+      <p:sp>
+        <p:nvSpPr>
+          <p:cNvPr id="70" name="PlaceHolder 2"/>
           <p:cNvSpPr>
             <a:spLocks noGrp="1"/>
           </p:cNvSpPr>
@@ -1910,8 +1793,8 @@
         </p:nvSpPr>
         <p:spPr>
           <a:xfrm>
-            <a:off x="838080" y="1825560"/>
-            <a:ext cx="3385800" cy="2075040"/>
+            <a:off x="609480" y="1604520"/>
+            <a:ext cx="3533040" cy="1896840"/>
           </a:xfrm>
           <a:prstGeom prst="rect">
             <a:avLst/>
@@ -1922,18 +1805,15 @@
             <a:normAutofit/>
           </a:bodyPr>
           <a:p>
-            <a:endParaRPr b="0" lang="de-DE" sz="2800" spc="-1" strike="noStrike">
-              <a:solidFill>
-                <a:srgbClr val="000000"/>
-              </a:solidFill>
-              <a:latin typeface="Calibri"/>
-            </a:endParaRPr>
-          </a:p>
-        </p:txBody>
-      </p:sp>
-      <p:sp>
-        <p:nvSpPr>
-          <p:cNvPr id="77" name="PlaceHolder 3"/>
+            <a:endParaRPr b="0" lang="en-US" sz="3200" spc="-1" strike="noStrike">
+              <a:latin typeface="Arial"/>
+            </a:endParaRPr>
+          </a:p>
+        </p:txBody>
+      </p:sp>
+      <p:sp>
+        <p:nvSpPr>
+          <p:cNvPr id="71" name="PlaceHolder 3"/>
           <p:cNvSpPr>
             <a:spLocks noGrp="1"/>
           </p:cNvSpPr>
@@ -1943,8 +1823,8 @@
         </p:nvSpPr>
         <p:spPr>
           <a:xfrm>
-            <a:off x="4393440" y="1825560"/>
-            <a:ext cx="3385800" cy="2075040"/>
+            <a:off x="4319640" y="1604520"/>
+            <a:ext cx="3533040" cy="1896840"/>
           </a:xfrm>
           <a:prstGeom prst="rect">
             <a:avLst/>
@@ -1955,18 +1835,15 @@
             <a:normAutofit/>
           </a:bodyPr>
           <a:p>
-            <a:endParaRPr b="0" lang="de-DE" sz="2800" spc="-1" strike="noStrike">
-              <a:solidFill>
-                <a:srgbClr val="000000"/>
-              </a:solidFill>
-              <a:latin typeface="Calibri"/>
-            </a:endParaRPr>
-          </a:p>
-        </p:txBody>
-      </p:sp>
-      <p:sp>
-        <p:nvSpPr>
-          <p:cNvPr id="78" name="PlaceHolder 4"/>
+            <a:endParaRPr b="0" lang="en-US" sz="3200" spc="-1" strike="noStrike">
+              <a:latin typeface="Arial"/>
+            </a:endParaRPr>
+          </a:p>
+        </p:txBody>
+      </p:sp>
+      <p:sp>
+        <p:nvSpPr>
+          <p:cNvPr id="72" name="PlaceHolder 4"/>
           <p:cNvSpPr>
             <a:spLocks noGrp="1"/>
           </p:cNvSpPr>
@@ -1976,8 +1853,8 @@
         </p:nvSpPr>
         <p:spPr>
           <a:xfrm>
-            <a:off x="7949160" y="1825560"/>
-            <a:ext cx="3385800" cy="2075040"/>
+            <a:off x="8029800" y="1604520"/>
+            <a:ext cx="3533040" cy="1896840"/>
           </a:xfrm>
           <a:prstGeom prst="rect">
             <a:avLst/>
@@ -1988,18 +1865,15 @@
             <a:normAutofit/>
           </a:bodyPr>
           <a:p>
-            <a:endParaRPr b="0" lang="de-DE" sz="2800" spc="-1" strike="noStrike">
-              <a:solidFill>
-                <a:srgbClr val="000000"/>
-              </a:solidFill>
-              <a:latin typeface="Calibri"/>
-            </a:endParaRPr>
-          </a:p>
-        </p:txBody>
-      </p:sp>
-      <p:sp>
-        <p:nvSpPr>
-          <p:cNvPr id="79" name="PlaceHolder 5"/>
+            <a:endParaRPr b="0" lang="en-US" sz="3200" spc="-1" strike="noStrike">
+              <a:latin typeface="Arial"/>
+            </a:endParaRPr>
+          </a:p>
+        </p:txBody>
+      </p:sp>
+      <p:sp>
+        <p:nvSpPr>
+          <p:cNvPr id="73" name="PlaceHolder 5"/>
           <p:cNvSpPr>
             <a:spLocks noGrp="1"/>
           </p:cNvSpPr>
@@ -2009,8 +1883,8 @@
         </p:nvSpPr>
         <p:spPr>
           <a:xfrm>
-            <a:off x="838080" y="4098240"/>
-            <a:ext cx="3385800" cy="2075040"/>
+            <a:off x="609480" y="3682080"/>
+            <a:ext cx="3533040" cy="1896840"/>
           </a:xfrm>
           <a:prstGeom prst="rect">
             <a:avLst/>
@@ -2021,18 +1895,15 @@
             <a:normAutofit/>
           </a:bodyPr>
           <a:p>
-            <a:endParaRPr b="0" lang="de-DE" sz="2800" spc="-1" strike="noStrike">
-              <a:solidFill>
-                <a:srgbClr val="000000"/>
-              </a:solidFill>
-              <a:latin typeface="Calibri"/>
-            </a:endParaRPr>
-          </a:p>
-        </p:txBody>
-      </p:sp>
-      <p:sp>
-        <p:nvSpPr>
-          <p:cNvPr id="80" name="PlaceHolder 6"/>
+            <a:endParaRPr b="0" lang="en-US" sz="3200" spc="-1" strike="noStrike">
+              <a:latin typeface="Arial"/>
+            </a:endParaRPr>
+          </a:p>
+        </p:txBody>
+      </p:sp>
+      <p:sp>
+        <p:nvSpPr>
+          <p:cNvPr id="74" name="PlaceHolder 6"/>
           <p:cNvSpPr>
             <a:spLocks noGrp="1"/>
           </p:cNvSpPr>
@@ -2042,8 +1913,8 @@
         </p:nvSpPr>
         <p:spPr>
           <a:xfrm>
-            <a:off x="4393440" y="4098240"/>
-            <a:ext cx="3385800" cy="2075040"/>
+            <a:off x="4319640" y="3682080"/>
+            <a:ext cx="3533040" cy="1896840"/>
           </a:xfrm>
           <a:prstGeom prst="rect">
             <a:avLst/>
@@ -2054,18 +1925,15 @@
             <a:normAutofit/>
           </a:bodyPr>
           <a:p>
-            <a:endParaRPr b="0" lang="de-DE" sz="2800" spc="-1" strike="noStrike">
-              <a:solidFill>
-                <a:srgbClr val="000000"/>
-              </a:solidFill>
-              <a:latin typeface="Calibri"/>
-            </a:endParaRPr>
-          </a:p>
-        </p:txBody>
-      </p:sp>
-      <p:sp>
-        <p:nvSpPr>
-          <p:cNvPr id="81" name="PlaceHolder 7"/>
+            <a:endParaRPr b="0" lang="en-US" sz="3200" spc="-1" strike="noStrike">
+              <a:latin typeface="Arial"/>
+            </a:endParaRPr>
+          </a:p>
+        </p:txBody>
+      </p:sp>
+      <p:sp>
+        <p:nvSpPr>
+          <p:cNvPr id="75" name="PlaceHolder 7"/>
           <p:cNvSpPr>
             <a:spLocks noGrp="1"/>
           </p:cNvSpPr>
@@ -2075,8 +1943,8 @@
         </p:nvSpPr>
         <p:spPr>
           <a:xfrm>
-            <a:off x="7949160" y="4098240"/>
-            <a:ext cx="3385800" cy="2075040"/>
+            <a:off x="8029800" y="3682080"/>
+            <a:ext cx="3533040" cy="1896840"/>
           </a:xfrm>
           <a:prstGeom prst="rect">
             <a:avLst/>
@@ -2087,11 +1955,8 @@
             <a:normAutofit/>
           </a:bodyPr>
           <a:p>
-            <a:endParaRPr b="0" lang="de-DE" sz="2800" spc="-1" strike="noStrike">
-              <a:solidFill>
-                <a:srgbClr val="000000"/>
-              </a:solidFill>
-              <a:latin typeface="Calibri"/>
+            <a:endParaRPr b="0" lang="en-US" sz="3200" spc="-1" strike="noStrike">
+              <a:latin typeface="Arial"/>
             </a:endParaRPr>
           </a:p>
         </p:txBody>
@@ -2120,7 +1985,7 @@
       </p:grpSpPr>
       <p:sp>
         <p:nvSpPr>
-          <p:cNvPr id="7" name="PlaceHolder 1"/>
+          <p:cNvPr id="4" name="PlaceHolder 1"/>
           <p:cNvSpPr>
             <a:spLocks noGrp="1"/>
           </p:cNvSpPr>
@@ -2130,8 +1995,8 @@
         </p:nvSpPr>
         <p:spPr>
           <a:xfrm>
-            <a:off x="838080" y="365040"/>
-            <a:ext cx="10515240" cy="1325160"/>
+            <a:off x="609480" y="273600"/>
+            <a:ext cx="10972440" cy="1144800"/>
           </a:xfrm>
           <a:prstGeom prst="rect">
             <a:avLst/>
@@ -2140,18 +2005,16 @@
         <p:txBody>
           <a:bodyPr lIns="0" rIns="0" tIns="0" bIns="0" anchor="ctr"/>
           <a:p>
-            <a:endParaRPr b="0" lang="de-DE" sz="1800" spc="-1" strike="noStrike">
-              <a:solidFill>
-                <a:srgbClr val="000000"/>
-              </a:solidFill>
-              <a:latin typeface="Calibri"/>
-            </a:endParaRPr>
-          </a:p>
-        </p:txBody>
-      </p:sp>
-      <p:sp>
-        <p:nvSpPr>
-          <p:cNvPr id="8" name="PlaceHolder 2"/>
+            <a:pPr algn="ctr"/>
+            <a:endParaRPr b="0" lang="en-US" sz="4400" spc="-1" strike="noStrike">
+              <a:latin typeface="Arial"/>
+            </a:endParaRPr>
+          </a:p>
+        </p:txBody>
+      </p:sp>
+      <p:sp>
+        <p:nvSpPr>
+          <p:cNvPr id="5" name="PlaceHolder 2"/>
           <p:cNvSpPr>
             <a:spLocks noGrp="1"/>
           </p:cNvSpPr>
@@ -2161,8 +2024,8 @@
         </p:nvSpPr>
         <p:spPr>
           <a:xfrm>
-            <a:off x="838080" y="1825560"/>
-            <a:ext cx="10515240" cy="4350960"/>
+            <a:off x="609480" y="1604520"/>
+            <a:ext cx="10972440" cy="3977280"/>
           </a:xfrm>
           <a:prstGeom prst="rect">
             <a:avLst/>
@@ -2173,11 +2036,8 @@
             <a:normAutofit/>
           </a:bodyPr>
           <a:p>
-            <a:endParaRPr b="0" lang="de-DE" sz="2800" spc="-1" strike="noStrike">
-              <a:solidFill>
-                <a:srgbClr val="000000"/>
-              </a:solidFill>
-              <a:latin typeface="Calibri"/>
+            <a:endParaRPr b="0" lang="en-US" sz="3200" spc="-1" strike="noStrike">
+              <a:latin typeface="Arial"/>
             </a:endParaRPr>
           </a:p>
         </p:txBody>
@@ -2206,7 +2066,7 @@
       </p:grpSpPr>
       <p:sp>
         <p:nvSpPr>
-          <p:cNvPr id="9" name="PlaceHolder 1"/>
+          <p:cNvPr id="6" name="PlaceHolder 1"/>
           <p:cNvSpPr>
             <a:spLocks noGrp="1"/>
           </p:cNvSpPr>
@@ -2216,8 +2076,8 @@
         </p:nvSpPr>
         <p:spPr>
           <a:xfrm>
-            <a:off x="838080" y="365040"/>
-            <a:ext cx="10515240" cy="1325160"/>
+            <a:off x="609480" y="273600"/>
+            <a:ext cx="10972440" cy="1144800"/>
           </a:xfrm>
           <a:prstGeom prst="rect">
             <a:avLst/>
@@ -2226,18 +2086,16 @@
         <p:txBody>
           <a:bodyPr lIns="0" rIns="0" tIns="0" bIns="0" anchor="ctr"/>
           <a:p>
-            <a:endParaRPr b="0" lang="de-DE" sz="1800" spc="-1" strike="noStrike">
-              <a:solidFill>
-                <a:srgbClr val="000000"/>
-              </a:solidFill>
-              <a:latin typeface="Calibri"/>
-            </a:endParaRPr>
-          </a:p>
-        </p:txBody>
-      </p:sp>
-      <p:sp>
-        <p:nvSpPr>
-          <p:cNvPr id="10" name="PlaceHolder 2"/>
+            <a:pPr algn="ctr"/>
+            <a:endParaRPr b="0" lang="en-US" sz="4400" spc="-1" strike="noStrike">
+              <a:latin typeface="Arial"/>
+            </a:endParaRPr>
+          </a:p>
+        </p:txBody>
+      </p:sp>
+      <p:sp>
+        <p:nvSpPr>
+          <p:cNvPr id="7" name="PlaceHolder 2"/>
           <p:cNvSpPr>
             <a:spLocks noGrp="1"/>
           </p:cNvSpPr>
@@ -2247,8 +2105,8 @@
         </p:nvSpPr>
         <p:spPr>
           <a:xfrm>
-            <a:off x="838080" y="1825560"/>
-            <a:ext cx="5131080" cy="4350960"/>
+            <a:off x="609480" y="1604520"/>
+            <a:ext cx="5354280" cy="3977280"/>
           </a:xfrm>
           <a:prstGeom prst="rect">
             <a:avLst/>
@@ -2259,18 +2117,15 @@
             <a:normAutofit/>
           </a:bodyPr>
           <a:p>
-            <a:endParaRPr b="0" lang="de-DE" sz="2800" spc="-1" strike="noStrike">
-              <a:solidFill>
-                <a:srgbClr val="000000"/>
-              </a:solidFill>
-              <a:latin typeface="Calibri"/>
-            </a:endParaRPr>
-          </a:p>
-        </p:txBody>
-      </p:sp>
-      <p:sp>
-        <p:nvSpPr>
-          <p:cNvPr id="11" name="PlaceHolder 3"/>
+            <a:endParaRPr b="0" lang="en-US" sz="3200" spc="-1" strike="noStrike">
+              <a:latin typeface="Arial"/>
+            </a:endParaRPr>
+          </a:p>
+        </p:txBody>
+      </p:sp>
+      <p:sp>
+        <p:nvSpPr>
+          <p:cNvPr id="8" name="PlaceHolder 3"/>
           <p:cNvSpPr>
             <a:spLocks noGrp="1"/>
           </p:cNvSpPr>
@@ -2280,8 +2135,8 @@
         </p:nvSpPr>
         <p:spPr>
           <a:xfrm>
-            <a:off x="6226200" y="1825560"/>
-            <a:ext cx="5131080" cy="4350960"/>
+            <a:off x="6231960" y="1604520"/>
+            <a:ext cx="5354280" cy="3977280"/>
           </a:xfrm>
           <a:prstGeom prst="rect">
             <a:avLst/>
@@ -2292,11 +2147,8 @@
             <a:normAutofit/>
           </a:bodyPr>
           <a:p>
-            <a:endParaRPr b="0" lang="de-DE" sz="2800" spc="-1" strike="noStrike">
-              <a:solidFill>
-                <a:srgbClr val="000000"/>
-              </a:solidFill>
-              <a:latin typeface="Calibri"/>
+            <a:endParaRPr b="0" lang="en-US" sz="3200" spc="-1" strike="noStrike">
+              <a:latin typeface="Arial"/>
             </a:endParaRPr>
           </a:p>
         </p:txBody>
@@ -2325,7 +2177,7 @@
       </p:grpSpPr>
       <p:sp>
         <p:nvSpPr>
-          <p:cNvPr id="12" name="PlaceHolder 1"/>
+          <p:cNvPr id="9" name="PlaceHolder 1"/>
           <p:cNvSpPr>
             <a:spLocks noGrp="1"/>
           </p:cNvSpPr>
@@ -2335,8 +2187,8 @@
         </p:nvSpPr>
         <p:spPr>
           <a:xfrm>
-            <a:off x="838080" y="365040"/>
-            <a:ext cx="10515240" cy="1325160"/>
+            <a:off x="609480" y="273600"/>
+            <a:ext cx="10972440" cy="1144800"/>
           </a:xfrm>
           <a:prstGeom prst="rect">
             <a:avLst/>
@@ -2345,11 +2197,9 @@
         <p:txBody>
           <a:bodyPr lIns="0" rIns="0" tIns="0" bIns="0" anchor="ctr"/>
           <a:p>
-            <a:endParaRPr b="0" lang="de-DE" sz="1800" spc="-1" strike="noStrike">
-              <a:solidFill>
-                <a:srgbClr val="000000"/>
-              </a:solidFill>
-              <a:latin typeface="Calibri"/>
+            <a:pPr algn="ctr"/>
+            <a:endParaRPr b="0" lang="en-US" sz="4400" spc="-1" strike="noStrike">
+              <a:latin typeface="Arial"/>
             </a:endParaRPr>
           </a:p>
         </p:txBody>
@@ -2378,7 +2228,7 @@
       </p:grpSpPr>
       <p:sp>
         <p:nvSpPr>
-          <p:cNvPr id="13" name="PlaceHolder 1"/>
+          <p:cNvPr id="10" name="PlaceHolder 1"/>
           <p:cNvSpPr>
             <a:spLocks noGrp="1"/>
           </p:cNvSpPr>
@@ -2388,8 +2238,8 @@
         </p:nvSpPr>
         <p:spPr>
           <a:xfrm>
-            <a:off x="838080" y="365040"/>
-            <a:ext cx="10515240" cy="6144120"/>
+            <a:off x="609480" y="273600"/>
+            <a:ext cx="10972440" cy="5307840"/>
           </a:xfrm>
           <a:prstGeom prst="rect">
             <a:avLst/>
@@ -2429,7 +2279,7 @@
       </p:grpSpPr>
       <p:sp>
         <p:nvSpPr>
-          <p:cNvPr id="14" name="PlaceHolder 1"/>
+          <p:cNvPr id="11" name="PlaceHolder 1"/>
           <p:cNvSpPr>
             <a:spLocks noGrp="1"/>
           </p:cNvSpPr>
@@ -2439,8 +2289,8 @@
         </p:nvSpPr>
         <p:spPr>
           <a:xfrm>
-            <a:off x="838080" y="365040"/>
-            <a:ext cx="10515240" cy="1325160"/>
+            <a:off x="609480" y="273600"/>
+            <a:ext cx="10972440" cy="1144800"/>
           </a:xfrm>
           <a:prstGeom prst="rect">
             <a:avLst/>
@@ -2449,18 +2299,16 @@
         <p:txBody>
           <a:bodyPr lIns="0" rIns="0" tIns="0" bIns="0" anchor="ctr"/>
           <a:p>
-            <a:endParaRPr b="0" lang="de-DE" sz="1800" spc="-1" strike="noStrike">
-              <a:solidFill>
-                <a:srgbClr val="000000"/>
-              </a:solidFill>
-              <a:latin typeface="Calibri"/>
-            </a:endParaRPr>
-          </a:p>
-        </p:txBody>
-      </p:sp>
-      <p:sp>
-        <p:nvSpPr>
-          <p:cNvPr id="15" name="PlaceHolder 2"/>
+            <a:pPr algn="ctr"/>
+            <a:endParaRPr b="0" lang="en-US" sz="4400" spc="-1" strike="noStrike">
+              <a:latin typeface="Arial"/>
+            </a:endParaRPr>
+          </a:p>
+        </p:txBody>
+      </p:sp>
+      <p:sp>
+        <p:nvSpPr>
+          <p:cNvPr id="12" name="PlaceHolder 2"/>
           <p:cNvSpPr>
             <a:spLocks noGrp="1"/>
           </p:cNvSpPr>
@@ -2470,8 +2318,8 @@
         </p:nvSpPr>
         <p:spPr>
           <a:xfrm>
-            <a:off x="838080" y="1825560"/>
-            <a:ext cx="5131080" cy="2075040"/>
+            <a:off x="609480" y="1604520"/>
+            <a:ext cx="5354280" cy="1896840"/>
           </a:xfrm>
           <a:prstGeom prst="rect">
             <a:avLst/>
@@ -2482,18 +2330,15 @@
             <a:normAutofit/>
           </a:bodyPr>
           <a:p>
-            <a:endParaRPr b="0" lang="de-DE" sz="2800" spc="-1" strike="noStrike">
-              <a:solidFill>
-                <a:srgbClr val="000000"/>
-              </a:solidFill>
-              <a:latin typeface="Calibri"/>
-            </a:endParaRPr>
-          </a:p>
-        </p:txBody>
-      </p:sp>
-      <p:sp>
-        <p:nvSpPr>
-          <p:cNvPr id="16" name="PlaceHolder 3"/>
+            <a:endParaRPr b="0" lang="en-US" sz="3200" spc="-1" strike="noStrike">
+              <a:latin typeface="Arial"/>
+            </a:endParaRPr>
+          </a:p>
+        </p:txBody>
+      </p:sp>
+      <p:sp>
+        <p:nvSpPr>
+          <p:cNvPr id="13" name="PlaceHolder 3"/>
           <p:cNvSpPr>
             <a:spLocks noGrp="1"/>
           </p:cNvSpPr>
@@ -2503,8 +2348,8 @@
         </p:nvSpPr>
         <p:spPr>
           <a:xfrm>
-            <a:off x="6226200" y="1825560"/>
-            <a:ext cx="5131080" cy="4350960"/>
+            <a:off x="6231960" y="1604520"/>
+            <a:ext cx="5354280" cy="3977280"/>
           </a:xfrm>
           <a:prstGeom prst="rect">
             <a:avLst/>
@@ -2515,18 +2360,15 @@
             <a:normAutofit/>
           </a:bodyPr>
           <a:p>
-            <a:endParaRPr b="0" lang="de-DE" sz="2800" spc="-1" strike="noStrike">
-              <a:solidFill>
-                <a:srgbClr val="000000"/>
-              </a:solidFill>
-              <a:latin typeface="Calibri"/>
-            </a:endParaRPr>
-          </a:p>
-        </p:txBody>
-      </p:sp>
-      <p:sp>
-        <p:nvSpPr>
-          <p:cNvPr id="17" name="PlaceHolder 4"/>
+            <a:endParaRPr b="0" lang="en-US" sz="3200" spc="-1" strike="noStrike">
+              <a:latin typeface="Arial"/>
+            </a:endParaRPr>
+          </a:p>
+        </p:txBody>
+      </p:sp>
+      <p:sp>
+        <p:nvSpPr>
+          <p:cNvPr id="14" name="PlaceHolder 4"/>
           <p:cNvSpPr>
             <a:spLocks noGrp="1"/>
           </p:cNvSpPr>
@@ -2536,8 +2378,8 @@
         </p:nvSpPr>
         <p:spPr>
           <a:xfrm>
-            <a:off x="838080" y="4098240"/>
-            <a:ext cx="5131080" cy="2075040"/>
+            <a:off x="609480" y="3682080"/>
+            <a:ext cx="5354280" cy="1896840"/>
           </a:xfrm>
           <a:prstGeom prst="rect">
             <a:avLst/>
@@ -2548,11 +2390,8 @@
             <a:normAutofit/>
           </a:bodyPr>
           <a:p>
-            <a:endParaRPr b="0" lang="de-DE" sz="2800" spc="-1" strike="noStrike">
-              <a:solidFill>
-                <a:srgbClr val="000000"/>
-              </a:solidFill>
-              <a:latin typeface="Calibri"/>
+            <a:endParaRPr b="0" lang="en-US" sz="3200" spc="-1" strike="noStrike">
+              <a:latin typeface="Arial"/>
             </a:endParaRPr>
           </a:p>
         </p:txBody>
@@ -2581,7 +2420,7 @@
       </p:grpSpPr>
       <p:sp>
         <p:nvSpPr>
-          <p:cNvPr id="18" name="PlaceHolder 1"/>
+          <p:cNvPr id="15" name="PlaceHolder 1"/>
           <p:cNvSpPr>
             <a:spLocks noGrp="1"/>
           </p:cNvSpPr>
@@ -2591,8 +2430,8 @@
         </p:nvSpPr>
         <p:spPr>
           <a:xfrm>
-            <a:off x="838080" y="365040"/>
-            <a:ext cx="10515240" cy="1325160"/>
+            <a:off x="609480" y="273600"/>
+            <a:ext cx="10972440" cy="1144800"/>
           </a:xfrm>
           <a:prstGeom prst="rect">
             <a:avLst/>
@@ -2601,18 +2440,16 @@
         <p:txBody>
           <a:bodyPr lIns="0" rIns="0" tIns="0" bIns="0" anchor="ctr"/>
           <a:p>
-            <a:endParaRPr b="0" lang="de-DE" sz="1800" spc="-1" strike="noStrike">
-              <a:solidFill>
-                <a:srgbClr val="000000"/>
-              </a:solidFill>
-              <a:latin typeface="Calibri"/>
-            </a:endParaRPr>
-          </a:p>
-        </p:txBody>
-      </p:sp>
-      <p:sp>
-        <p:nvSpPr>
-          <p:cNvPr id="19" name="PlaceHolder 2"/>
+            <a:pPr algn="ctr"/>
+            <a:endParaRPr b="0" lang="en-US" sz="4400" spc="-1" strike="noStrike">
+              <a:latin typeface="Arial"/>
+            </a:endParaRPr>
+          </a:p>
+        </p:txBody>
+      </p:sp>
+      <p:sp>
+        <p:nvSpPr>
+          <p:cNvPr id="16" name="PlaceHolder 2"/>
           <p:cNvSpPr>
             <a:spLocks noGrp="1"/>
           </p:cNvSpPr>
@@ -2622,8 +2459,8 @@
         </p:nvSpPr>
         <p:spPr>
           <a:xfrm>
-            <a:off x="838080" y="1825560"/>
-            <a:ext cx="5131080" cy="4350960"/>
+            <a:off x="609480" y="1604520"/>
+            <a:ext cx="5354280" cy="3977280"/>
           </a:xfrm>
           <a:prstGeom prst="rect">
             <a:avLst/>
@@ -2634,18 +2471,15 @@
             <a:normAutofit/>
           </a:bodyPr>
           <a:p>
-            <a:endParaRPr b="0" lang="de-DE" sz="2800" spc="-1" strike="noStrike">
-              <a:solidFill>
-                <a:srgbClr val="000000"/>
-              </a:solidFill>
-              <a:latin typeface="Calibri"/>
-            </a:endParaRPr>
-          </a:p>
-        </p:txBody>
-      </p:sp>
-      <p:sp>
-        <p:nvSpPr>
-          <p:cNvPr id="20" name="PlaceHolder 3"/>
+            <a:endParaRPr b="0" lang="en-US" sz="3200" spc="-1" strike="noStrike">
+              <a:latin typeface="Arial"/>
+            </a:endParaRPr>
+          </a:p>
+        </p:txBody>
+      </p:sp>
+      <p:sp>
+        <p:nvSpPr>
+          <p:cNvPr id="17" name="PlaceHolder 3"/>
           <p:cNvSpPr>
             <a:spLocks noGrp="1"/>
           </p:cNvSpPr>
@@ -2655,8 +2489,8 @@
         </p:nvSpPr>
         <p:spPr>
           <a:xfrm>
-            <a:off x="6226200" y="1825560"/>
-            <a:ext cx="5131080" cy="2075040"/>
+            <a:off x="6231960" y="1604520"/>
+            <a:ext cx="5354280" cy="1896840"/>
           </a:xfrm>
           <a:prstGeom prst="rect">
             <a:avLst/>
@@ -2667,18 +2501,15 @@
             <a:normAutofit/>
           </a:bodyPr>
           <a:p>
-            <a:endParaRPr b="0" lang="de-DE" sz="2800" spc="-1" strike="noStrike">
-              <a:solidFill>
-                <a:srgbClr val="000000"/>
-              </a:solidFill>
-              <a:latin typeface="Calibri"/>
-            </a:endParaRPr>
-          </a:p>
-        </p:txBody>
-      </p:sp>
-      <p:sp>
-        <p:nvSpPr>
-          <p:cNvPr id="21" name="PlaceHolder 4"/>
+            <a:endParaRPr b="0" lang="en-US" sz="3200" spc="-1" strike="noStrike">
+              <a:latin typeface="Arial"/>
+            </a:endParaRPr>
+          </a:p>
+        </p:txBody>
+      </p:sp>
+      <p:sp>
+        <p:nvSpPr>
+          <p:cNvPr id="18" name="PlaceHolder 4"/>
           <p:cNvSpPr>
             <a:spLocks noGrp="1"/>
           </p:cNvSpPr>
@@ -2688,8 +2519,8 @@
         </p:nvSpPr>
         <p:spPr>
           <a:xfrm>
-            <a:off x="6226200" y="4098240"/>
-            <a:ext cx="5131080" cy="2075040"/>
+            <a:off x="6231960" y="3682080"/>
+            <a:ext cx="5354280" cy="1896840"/>
           </a:xfrm>
           <a:prstGeom prst="rect">
             <a:avLst/>
@@ -2700,11 +2531,8 @@
             <a:normAutofit/>
           </a:bodyPr>
           <a:p>
-            <a:endParaRPr b="0" lang="de-DE" sz="2800" spc="-1" strike="noStrike">
-              <a:solidFill>
-                <a:srgbClr val="000000"/>
-              </a:solidFill>
-              <a:latin typeface="Calibri"/>
+            <a:endParaRPr b="0" lang="en-US" sz="3200" spc="-1" strike="noStrike">
+              <a:latin typeface="Arial"/>
             </a:endParaRPr>
           </a:p>
         </p:txBody>
@@ -2733,7 +2561,7 @@
       </p:grpSpPr>
       <p:sp>
         <p:nvSpPr>
-          <p:cNvPr id="22" name="PlaceHolder 1"/>
+          <p:cNvPr id="19" name="PlaceHolder 1"/>
           <p:cNvSpPr>
             <a:spLocks noGrp="1"/>
           </p:cNvSpPr>
@@ -2743,8 +2571,8 @@
         </p:nvSpPr>
         <p:spPr>
           <a:xfrm>
-            <a:off x="838080" y="365040"/>
-            <a:ext cx="10515240" cy="1325160"/>
+            <a:off x="609480" y="273600"/>
+            <a:ext cx="10972440" cy="1144800"/>
           </a:xfrm>
           <a:prstGeom prst="rect">
             <a:avLst/>
@@ -2753,18 +2581,16 @@
         <p:txBody>
           <a:bodyPr lIns="0" rIns="0" tIns="0" bIns="0" anchor="ctr"/>
           <a:p>
-            <a:endParaRPr b="0" lang="de-DE" sz="1800" spc="-1" strike="noStrike">
-              <a:solidFill>
-                <a:srgbClr val="000000"/>
-              </a:solidFill>
-              <a:latin typeface="Calibri"/>
-            </a:endParaRPr>
-          </a:p>
-        </p:txBody>
-      </p:sp>
-      <p:sp>
-        <p:nvSpPr>
-          <p:cNvPr id="23" name="PlaceHolder 2"/>
+            <a:pPr algn="ctr"/>
+            <a:endParaRPr b="0" lang="en-US" sz="4400" spc="-1" strike="noStrike">
+              <a:latin typeface="Arial"/>
+            </a:endParaRPr>
+          </a:p>
+        </p:txBody>
+      </p:sp>
+      <p:sp>
+        <p:nvSpPr>
+          <p:cNvPr id="20" name="PlaceHolder 2"/>
           <p:cNvSpPr>
             <a:spLocks noGrp="1"/>
           </p:cNvSpPr>
@@ -2774,8 +2600,8 @@
         </p:nvSpPr>
         <p:spPr>
           <a:xfrm>
-            <a:off x="838080" y="1825560"/>
-            <a:ext cx="5131080" cy="2075040"/>
+            <a:off x="609480" y="1604520"/>
+            <a:ext cx="5354280" cy="1896840"/>
           </a:xfrm>
           <a:prstGeom prst="rect">
             <a:avLst/>
@@ -2786,18 +2612,15 @@
             <a:normAutofit/>
           </a:bodyPr>
           <a:p>
-            <a:endParaRPr b="0" lang="de-DE" sz="2800" spc="-1" strike="noStrike">
-              <a:solidFill>
-                <a:srgbClr val="000000"/>
-              </a:solidFill>
-              <a:latin typeface="Calibri"/>
-            </a:endParaRPr>
-          </a:p>
-        </p:txBody>
-      </p:sp>
-      <p:sp>
-        <p:nvSpPr>
-          <p:cNvPr id="24" name="PlaceHolder 3"/>
+            <a:endParaRPr b="0" lang="en-US" sz="3200" spc="-1" strike="noStrike">
+              <a:latin typeface="Arial"/>
+            </a:endParaRPr>
+          </a:p>
+        </p:txBody>
+      </p:sp>
+      <p:sp>
+        <p:nvSpPr>
+          <p:cNvPr id="21" name="PlaceHolder 3"/>
           <p:cNvSpPr>
             <a:spLocks noGrp="1"/>
           </p:cNvSpPr>
@@ -2807,8 +2630,8 @@
         </p:nvSpPr>
         <p:spPr>
           <a:xfrm>
-            <a:off x="6226200" y="1825560"/>
-            <a:ext cx="5131080" cy="2075040"/>
+            <a:off x="6231960" y="1604520"/>
+            <a:ext cx="5354280" cy="1896840"/>
           </a:xfrm>
           <a:prstGeom prst="rect">
             <a:avLst/>
@@ -2819,18 +2642,15 @@
             <a:normAutofit/>
           </a:bodyPr>
           <a:p>
-            <a:endParaRPr b="0" lang="de-DE" sz="2800" spc="-1" strike="noStrike">
-              <a:solidFill>
-                <a:srgbClr val="000000"/>
-              </a:solidFill>
-              <a:latin typeface="Calibri"/>
-            </a:endParaRPr>
-          </a:p>
-        </p:txBody>
-      </p:sp>
-      <p:sp>
-        <p:nvSpPr>
-          <p:cNvPr id="25" name="PlaceHolder 4"/>
+            <a:endParaRPr b="0" lang="en-US" sz="3200" spc="-1" strike="noStrike">
+              <a:latin typeface="Arial"/>
+            </a:endParaRPr>
+          </a:p>
+        </p:txBody>
+      </p:sp>
+      <p:sp>
+        <p:nvSpPr>
+          <p:cNvPr id="22" name="PlaceHolder 4"/>
           <p:cNvSpPr>
             <a:spLocks noGrp="1"/>
           </p:cNvSpPr>
@@ -2840,8 +2660,8 @@
         </p:nvSpPr>
         <p:spPr>
           <a:xfrm>
-            <a:off x="838080" y="4098240"/>
-            <a:ext cx="10515240" cy="2075040"/>
+            <a:off x="609480" y="3682080"/>
+            <a:ext cx="10972440" cy="1896840"/>
           </a:xfrm>
           <a:prstGeom prst="rect">
             <a:avLst/>
@@ -2852,11 +2672,8 @@
             <a:normAutofit/>
           </a:bodyPr>
           <a:p>
-            <a:endParaRPr b="0" lang="de-DE" sz="2800" spc="-1" strike="noStrike">
-              <a:solidFill>
-                <a:srgbClr val="000000"/>
-              </a:solidFill>
-              <a:latin typeface="Calibri"/>
+            <a:endParaRPr b="0" lang="en-US" sz="3200" spc="-1" strike="noStrike">
+              <a:latin typeface="Arial"/>
             </a:endParaRPr>
           </a:p>
         </p:txBody>
@@ -2902,35 +2719,24 @@
         </p:nvSpPr>
         <p:spPr>
           <a:xfrm>
-            <a:off x="1523880" y="1122480"/>
-            <a:ext cx="9143640" cy="2387160"/>
-          </a:xfrm>
-          <a:prstGeom prst="rect">
-            <a:avLst/>
-          </a:prstGeom>
-        </p:spPr>
-        <p:txBody>
-          <a:bodyPr anchor="b"/>
-          <a:p>
-            <a:pPr algn="ctr">
-              <a:lnSpc>
-                <a:spcPct val="90000"/>
-              </a:lnSpc>
-            </a:pPr>
+            <a:off x="838080" y="365040"/>
+            <a:ext cx="10514880" cy="1324800"/>
+          </a:xfrm>
+          <a:prstGeom prst="rect">
+            <a:avLst/>
+          </a:prstGeom>
+        </p:spPr>
+        <p:txBody>
+          <a:bodyPr lIns="0" rIns="0" tIns="0" bIns="0" anchor="ctr"/>
+          <a:p>
             <a:r>
-              <a:rPr b="0" lang="de-DE" sz="6000" spc="-1" strike="noStrike">
-                <a:solidFill>
-                  <a:srgbClr val="000000"/>
-                </a:solidFill>
-                <a:latin typeface="Calibri Light"/>
+              <a:rPr b="0" lang="en-US" sz="1800" spc="-1" strike="noStrike">
+                <a:latin typeface="Arial"/>
               </a:rPr>
-              <a:t>Mastertitelformat bearbeiten</a:t>
+              <a:t>Click to edit the title text format</a:t>
             </a:r>
-            <a:endParaRPr b="0" lang="de-DE" sz="6000" spc="-1" strike="noStrike">
-              <a:solidFill>
-                <a:srgbClr val="000000"/>
-              </a:solidFill>
-              <a:latin typeface="Calibri"/>
+            <a:endParaRPr b="0" lang="en-US" sz="1800" spc="-1" strike="noStrike">
+              <a:latin typeface="Arial"/>
             </a:endParaRPr>
           </a:p>
         </p:txBody>
@@ -2938,118 +2744,6 @@
       <p:sp>
         <p:nvSpPr>
           <p:cNvPr id="1" name="PlaceHolder 2"/>
-          <p:cNvSpPr>
-            <a:spLocks noGrp="1"/>
-          </p:cNvSpPr>
-          <p:nvPr>
-            <p:ph type="dt"/>
-          </p:nvPr>
-        </p:nvSpPr>
-        <p:spPr>
-          <a:xfrm>
-            <a:off x="838080" y="6356520"/>
-            <a:ext cx="2742840" cy="364680"/>
-          </a:xfrm>
-          <a:prstGeom prst="rect">
-            <a:avLst/>
-          </a:prstGeom>
-        </p:spPr>
-        <p:txBody>
-          <a:bodyPr anchor="ctr"/>
-          <a:p>
-            <a:pPr>
-              <a:lnSpc>
-                <a:spcPct val="100000"/>
-              </a:lnSpc>
-            </a:pPr>
-            <a:fld id="{8A0C5CDB-A327-4EFA-8B89-ADA546DA93C7}" type="datetime">
-              <a:rPr b="0" lang="en-US" sz="1200" spc="-1" strike="noStrike">
-                <a:solidFill>
-                  <a:srgbClr val="8b8b8b"/>
-                </a:solidFill>
-                <a:latin typeface="Calibri"/>
-              </a:rPr>
-              <a:t>5/6/20</a:t>
-            </a:fld>
-            <a:endParaRPr b="0" lang="en-US" sz="1200" spc="-1" strike="noStrike">
-              <a:latin typeface="Times New Roman"/>
-            </a:endParaRPr>
-          </a:p>
-        </p:txBody>
-      </p:sp>
-      <p:sp>
-        <p:nvSpPr>
-          <p:cNvPr id="2" name="PlaceHolder 3"/>
-          <p:cNvSpPr>
-            <a:spLocks noGrp="1"/>
-          </p:cNvSpPr>
-          <p:nvPr>
-            <p:ph type="ftr"/>
-          </p:nvPr>
-        </p:nvSpPr>
-        <p:spPr>
-          <a:xfrm>
-            <a:off x="4038480" y="6356520"/>
-            <a:ext cx="4114440" cy="364680"/>
-          </a:xfrm>
-          <a:prstGeom prst="rect">
-            <a:avLst/>
-          </a:prstGeom>
-        </p:spPr>
-        <p:txBody>
-          <a:bodyPr anchor="ctr"/>
-          <a:p>
-            <a:endParaRPr b="0" lang="en-US" sz="2400" spc="-1" strike="noStrike">
-              <a:latin typeface="Times New Roman"/>
-            </a:endParaRPr>
-          </a:p>
-        </p:txBody>
-      </p:sp>
-      <p:sp>
-        <p:nvSpPr>
-          <p:cNvPr id="3" name="PlaceHolder 4"/>
-          <p:cNvSpPr>
-            <a:spLocks noGrp="1"/>
-          </p:cNvSpPr>
-          <p:nvPr>
-            <p:ph type="sldNum"/>
-          </p:nvPr>
-        </p:nvSpPr>
-        <p:spPr>
-          <a:xfrm>
-            <a:off x="8610480" y="6356520"/>
-            <a:ext cx="2742840" cy="364680"/>
-          </a:xfrm>
-          <a:prstGeom prst="rect">
-            <a:avLst/>
-          </a:prstGeom>
-        </p:spPr>
-        <p:txBody>
-          <a:bodyPr anchor="ctr"/>
-          <a:p>
-            <a:pPr algn="r">
-              <a:lnSpc>
-                <a:spcPct val="100000"/>
-              </a:lnSpc>
-            </a:pPr>
-            <a:fld id="{F8C368DC-68A1-42C6-8291-743CFBA3325F}" type="slidenum">
-              <a:rPr b="0" lang="en-US" sz="1200" spc="-1" strike="noStrike">
-                <a:solidFill>
-                  <a:srgbClr val="8b8b8b"/>
-                </a:solidFill>
-                <a:latin typeface="Calibri"/>
-              </a:rPr>
-              <a:t>&lt;number&gt;</a:t>
-            </a:fld>
-            <a:endParaRPr b="0" lang="en-US" sz="1200" spc="-1" strike="noStrike">
-              <a:latin typeface="Times New Roman"/>
-            </a:endParaRPr>
-          </a:p>
-        </p:txBody>
-      </p:sp>
-      <p:sp>
-        <p:nvSpPr>
-          <p:cNvPr id="4" name="PlaceHolder 5"/>
           <p:cNvSpPr>
             <a:spLocks noGrp="1"/>
           </p:cNvSpPr>
@@ -3083,19 +2777,13 @@
               <a:buChar char=""/>
             </a:pPr>
             <a:r>
-              <a:rPr b="0" lang="de-DE" sz="2800" spc="-1" strike="noStrike">
-                <a:solidFill>
-                  <a:srgbClr val="000000"/>
-                </a:solidFill>
-                <a:latin typeface="Calibri"/>
+              <a:rPr b="0" lang="en-US" sz="3200" spc="-1" strike="noStrike">
+                <a:latin typeface="Arial"/>
               </a:rPr>
               <a:t>Click to edit the outline text format</a:t>
             </a:r>
-            <a:endParaRPr b="0" lang="de-DE" sz="2800" spc="-1" strike="noStrike">
-              <a:solidFill>
-                <a:srgbClr val="000000"/>
-              </a:solidFill>
-              <a:latin typeface="Calibri"/>
+            <a:endParaRPr b="0" lang="en-US" sz="3200" spc="-1" strike="noStrike">
+              <a:latin typeface="Arial"/>
             </a:endParaRPr>
           </a:p>
           <a:p>
@@ -3111,19 +2799,13 @@
               <a:buChar char=""/>
             </a:pPr>
             <a:r>
-              <a:rPr b="0" lang="de-DE" sz="2000" spc="-1" strike="noStrike">
-                <a:solidFill>
-                  <a:srgbClr val="000000"/>
-                </a:solidFill>
-                <a:latin typeface="Calibri"/>
+              <a:rPr b="0" lang="en-US" sz="2800" spc="-1" strike="noStrike">
+                <a:latin typeface="Arial"/>
               </a:rPr>
               <a:t>Second Outline Level</a:t>
             </a:r>
-            <a:endParaRPr b="0" lang="de-DE" sz="2000" spc="-1" strike="noStrike">
-              <a:solidFill>
-                <a:srgbClr val="000000"/>
-              </a:solidFill>
-              <a:latin typeface="Calibri"/>
+            <a:endParaRPr b="0" lang="en-US" sz="2800" spc="-1" strike="noStrike">
+              <a:latin typeface="Arial"/>
             </a:endParaRPr>
           </a:p>
           <a:p>
@@ -3139,19 +2821,13 @@
               <a:buChar char=""/>
             </a:pPr>
             <a:r>
-              <a:rPr b="0" lang="de-DE" sz="1800" spc="-1" strike="noStrike">
-                <a:solidFill>
-                  <a:srgbClr val="000000"/>
-                </a:solidFill>
-                <a:latin typeface="Calibri"/>
+              <a:rPr b="0" lang="en-US" sz="2400" spc="-1" strike="noStrike">
+                <a:latin typeface="Arial"/>
               </a:rPr>
               <a:t>Third Outline Level</a:t>
             </a:r>
-            <a:endParaRPr b="0" lang="de-DE" sz="1800" spc="-1" strike="noStrike">
-              <a:solidFill>
-                <a:srgbClr val="000000"/>
-              </a:solidFill>
-              <a:latin typeface="Calibri"/>
+            <a:endParaRPr b="0" lang="en-US" sz="2400" spc="-1" strike="noStrike">
+              <a:latin typeface="Arial"/>
             </a:endParaRPr>
           </a:p>
           <a:p>
@@ -3167,19 +2843,13 @@
               <a:buChar char=""/>
             </a:pPr>
             <a:r>
-              <a:rPr b="0" lang="de-DE" sz="1800" spc="-1" strike="noStrike">
-                <a:solidFill>
-                  <a:srgbClr val="000000"/>
-                </a:solidFill>
-                <a:latin typeface="Calibri"/>
+              <a:rPr b="0" lang="en-US" sz="2000" spc="-1" strike="noStrike">
+                <a:latin typeface="Arial"/>
               </a:rPr>
               <a:t>Fourth Outline Level</a:t>
             </a:r>
-            <a:endParaRPr b="0" lang="de-DE" sz="1800" spc="-1" strike="noStrike">
-              <a:solidFill>
-                <a:srgbClr val="000000"/>
-              </a:solidFill>
-              <a:latin typeface="Calibri"/>
+            <a:endParaRPr b="0" lang="en-US" sz="2000" spc="-1" strike="noStrike">
+              <a:latin typeface="Arial"/>
             </a:endParaRPr>
           </a:p>
           <a:p>
@@ -3195,19 +2865,13 @@
               <a:buChar char=""/>
             </a:pPr>
             <a:r>
-              <a:rPr b="0" lang="de-DE" sz="2000" spc="-1" strike="noStrike">
-                <a:solidFill>
-                  <a:srgbClr val="000000"/>
-                </a:solidFill>
-                <a:latin typeface="Calibri"/>
+              <a:rPr b="0" lang="en-US" sz="2000" spc="-1" strike="noStrike">
+                <a:latin typeface="Arial"/>
               </a:rPr>
               <a:t>Fifth Outline Level</a:t>
             </a:r>
-            <a:endParaRPr b="0" lang="de-DE" sz="2000" spc="-1" strike="noStrike">
-              <a:solidFill>
-                <a:srgbClr val="000000"/>
-              </a:solidFill>
-              <a:latin typeface="Calibri"/>
+            <a:endParaRPr b="0" lang="en-US" sz="2000" spc="-1" strike="noStrike">
+              <a:latin typeface="Arial"/>
             </a:endParaRPr>
           </a:p>
           <a:p>
@@ -3223,19 +2887,13 @@
               <a:buChar char=""/>
             </a:pPr>
             <a:r>
-              <a:rPr b="0" lang="de-DE" sz="2000" spc="-1" strike="noStrike">
-                <a:solidFill>
-                  <a:srgbClr val="000000"/>
-                </a:solidFill>
-                <a:latin typeface="Calibri"/>
+              <a:rPr b="0" lang="en-US" sz="2000" spc="-1" strike="noStrike">
+                <a:latin typeface="Arial"/>
               </a:rPr>
               <a:t>Sixth Outline Level</a:t>
             </a:r>
-            <a:endParaRPr b="0" lang="de-DE" sz="2000" spc="-1" strike="noStrike">
-              <a:solidFill>
-                <a:srgbClr val="000000"/>
-              </a:solidFill>
-              <a:latin typeface="Calibri"/>
+            <a:endParaRPr b="0" lang="en-US" sz="2000" spc="-1" strike="noStrike">
+              <a:latin typeface="Arial"/>
             </a:endParaRPr>
           </a:p>
           <a:p>
@@ -3251,19 +2909,13 @@
               <a:buChar char=""/>
             </a:pPr>
             <a:r>
-              <a:rPr b="0" lang="de-DE" sz="2000" spc="-1" strike="noStrike">
-                <a:solidFill>
-                  <a:srgbClr val="000000"/>
-                </a:solidFill>
-                <a:latin typeface="Calibri"/>
+              <a:rPr b="0" lang="en-US" sz="2000" spc="-1" strike="noStrike">
+                <a:latin typeface="Arial"/>
               </a:rPr>
               <a:t>Seventh Outline Level</a:t>
             </a:r>
-            <a:endParaRPr b="0" lang="de-DE" sz="2000" spc="-1" strike="noStrike">
-              <a:solidFill>
-                <a:srgbClr val="000000"/>
-              </a:solidFill>
-              <a:latin typeface="Calibri"/>
+            <a:endParaRPr b="0" lang="en-US" sz="2000" spc="-1" strike="noStrike">
+              <a:latin typeface="Arial"/>
             </a:endParaRPr>
           </a:p>
         </p:txBody>
@@ -3314,7 +2966,7 @@
       </p:grpSpPr>
       <p:sp>
         <p:nvSpPr>
-          <p:cNvPr id="41" name="PlaceHolder 1"/>
+          <p:cNvPr id="38" name="PlaceHolder 1"/>
           <p:cNvSpPr>
             <a:spLocks noGrp="1"/>
           </p:cNvSpPr>
@@ -3324,42 +2976,32 @@
         </p:nvSpPr>
         <p:spPr>
           <a:xfrm>
-            <a:off x="838080" y="365040"/>
-            <a:ext cx="10515240" cy="1325160"/>
-          </a:xfrm>
-          <a:prstGeom prst="rect">
-            <a:avLst/>
-          </a:prstGeom>
-        </p:spPr>
-        <p:txBody>
-          <a:bodyPr anchor="ctr"/>
-          <a:p>
-            <a:pPr>
-              <a:lnSpc>
-                <a:spcPct val="90000"/>
-              </a:lnSpc>
-            </a:pPr>
+            <a:off x="609480" y="273600"/>
+            <a:ext cx="10972440" cy="1144800"/>
+          </a:xfrm>
+          <a:prstGeom prst="rect">
+            <a:avLst/>
+          </a:prstGeom>
+        </p:spPr>
+        <p:txBody>
+          <a:bodyPr lIns="0" rIns="0" tIns="0" bIns="0" anchor="ctr"/>
+          <a:p>
+            <a:pPr algn="ctr"/>
             <a:r>
-              <a:rPr b="0" lang="de-DE" sz="4400" spc="-1" strike="noStrike">
-                <a:solidFill>
-                  <a:srgbClr val="000000"/>
-                </a:solidFill>
-                <a:latin typeface="Calibri Light"/>
+              <a:rPr b="0" lang="en-US" sz="4400" spc="-1" strike="noStrike">
+                <a:latin typeface="Arial"/>
               </a:rPr>
-              <a:t>Mastertitelformat bearbeiten</a:t>
+              <a:t>Click to edit the title text format</a:t>
             </a:r>
-            <a:endParaRPr b="0" lang="de-DE" sz="4400" spc="-1" strike="noStrike">
-              <a:solidFill>
-                <a:srgbClr val="000000"/>
-              </a:solidFill>
-              <a:latin typeface="Calibri"/>
-            </a:endParaRPr>
-          </a:p>
-        </p:txBody>
-      </p:sp>
-      <p:sp>
-        <p:nvSpPr>
-          <p:cNvPr id="42" name="PlaceHolder 2"/>
+            <a:endParaRPr b="0" lang="en-US" sz="4400" spc="-1" strike="noStrike">
+              <a:latin typeface="Arial"/>
+            </a:endParaRPr>
+          </a:p>
+        </p:txBody>
+      </p:sp>
+      <p:sp>
+        <p:nvSpPr>
+          <p:cNvPr id="39" name="PlaceHolder 2"/>
           <p:cNvSpPr>
             <a:spLocks noGrp="1"/>
           </p:cNvSpPr>
@@ -3369,275 +3011,169 @@
         </p:nvSpPr>
         <p:spPr>
           <a:xfrm>
-            <a:off x="838080" y="1825560"/>
-            <a:ext cx="10515240" cy="4350960"/>
-          </a:xfrm>
-          <a:prstGeom prst="rect">
-            <a:avLst/>
-          </a:prstGeom>
-        </p:spPr>
-        <p:txBody>
-          <a:bodyPr/>
-          <a:p>
-            <a:pPr marL="228600" indent="-228240">
-              <a:lnSpc>
-                <a:spcPct val="90000"/>
-              </a:lnSpc>
+            <a:off x="609480" y="1604520"/>
+            <a:ext cx="10972440" cy="3977280"/>
+          </a:xfrm>
+          <a:prstGeom prst="rect">
+            <a:avLst/>
+          </a:prstGeom>
+        </p:spPr>
+        <p:txBody>
+          <a:bodyPr lIns="0" rIns="0" tIns="0" bIns="0">
+            <a:normAutofit/>
+          </a:bodyPr>
+          <a:p>
+            <a:pPr marL="432000" indent="-324000">
               <a:spcBef>
-                <a:spcPts val="1001"/>
+                <a:spcPts val="1417"/>
               </a:spcBef>
               <a:buClr>
                 <a:srgbClr val="000000"/>
               </a:buClr>
-              <a:buFont typeface="Arial"/>
-              <a:buChar char="•"/>
+              <a:buSzPct val="45000"/>
+              <a:buFont typeface="Wingdings" charset="2"/>
+              <a:buChar char=""/>
             </a:pPr>
             <a:r>
-              <a:rPr b="0" lang="de-DE" sz="2800" spc="-1" strike="noStrike">
-                <a:solidFill>
-                  <a:srgbClr val="000000"/>
-                </a:solidFill>
-                <a:latin typeface="Calibri"/>
+              <a:rPr b="0" lang="en-US" sz="3200" spc="-1" strike="noStrike">
+                <a:latin typeface="Arial"/>
               </a:rPr>
-              <a:t>Mastertextformat bearbeiten</a:t>
+              <a:t>Click to edit the outline text format</a:t>
             </a:r>
-            <a:endParaRPr b="0" lang="de-DE" sz="2800" spc="-1" strike="noStrike">
-              <a:solidFill>
-                <a:srgbClr val="000000"/>
-              </a:solidFill>
-              <a:latin typeface="Calibri"/>
-            </a:endParaRPr>
-          </a:p>
-          <a:p>
-            <a:pPr lvl="1" marL="685800" indent="-228240">
-              <a:lnSpc>
-                <a:spcPct val="90000"/>
-              </a:lnSpc>
+            <a:endParaRPr b="0" lang="en-US" sz="3200" spc="-1" strike="noStrike">
+              <a:latin typeface="Arial"/>
+            </a:endParaRPr>
+          </a:p>
+          <a:p>
+            <a:pPr lvl="1" marL="864000" indent="-324000">
               <a:spcBef>
-                <a:spcPts val="499"/>
+                <a:spcPts val="1134"/>
               </a:spcBef>
               <a:buClr>
                 <a:srgbClr val="000000"/>
               </a:buClr>
-              <a:buFont typeface="Arial"/>
-              <a:buChar char="•"/>
+              <a:buSzPct val="75000"/>
+              <a:buFont typeface="Symbol" charset="2"/>
+              <a:buChar char=""/>
             </a:pPr>
             <a:r>
-              <a:rPr b="0" lang="de-DE" sz="2400" spc="-1" strike="noStrike">
-                <a:solidFill>
-                  <a:srgbClr val="000000"/>
-                </a:solidFill>
-                <a:latin typeface="Calibri"/>
+              <a:rPr b="0" lang="en-US" sz="2800" spc="-1" strike="noStrike">
+                <a:latin typeface="Arial"/>
               </a:rPr>
-              <a:t>Zweite Ebene</a:t>
+              <a:t>Second Outline Level</a:t>
             </a:r>
-            <a:endParaRPr b="0" lang="de-DE" sz="2400" spc="-1" strike="noStrike">
-              <a:solidFill>
-                <a:srgbClr val="000000"/>
-              </a:solidFill>
-              <a:latin typeface="Calibri"/>
-            </a:endParaRPr>
-          </a:p>
-          <a:p>
-            <a:pPr lvl="2" marL="1143000" indent="-228240">
-              <a:lnSpc>
-                <a:spcPct val="90000"/>
-              </a:lnSpc>
+            <a:endParaRPr b="0" lang="en-US" sz="2800" spc="-1" strike="noStrike">
+              <a:latin typeface="Arial"/>
+            </a:endParaRPr>
+          </a:p>
+          <a:p>
+            <a:pPr lvl="2" marL="1296000" indent="-288000">
               <a:spcBef>
-                <a:spcPts val="499"/>
+                <a:spcPts val="850"/>
               </a:spcBef>
               <a:buClr>
                 <a:srgbClr val="000000"/>
               </a:buClr>
-              <a:buFont typeface="Arial"/>
-              <a:buChar char="•"/>
+              <a:buSzPct val="45000"/>
+              <a:buFont typeface="Wingdings" charset="2"/>
+              <a:buChar char=""/>
             </a:pPr>
             <a:r>
-              <a:rPr b="0" lang="de-DE" sz="2000" spc="-1" strike="noStrike">
-                <a:solidFill>
-                  <a:srgbClr val="000000"/>
-                </a:solidFill>
-                <a:latin typeface="Calibri"/>
+              <a:rPr b="0" lang="en-US" sz="2400" spc="-1" strike="noStrike">
+                <a:latin typeface="Arial"/>
               </a:rPr>
-              <a:t>Dritte Ebene</a:t>
+              <a:t>Third Outline Level</a:t>
             </a:r>
-            <a:endParaRPr b="0" lang="de-DE" sz="2000" spc="-1" strike="noStrike">
-              <a:solidFill>
-                <a:srgbClr val="000000"/>
-              </a:solidFill>
-              <a:latin typeface="Calibri"/>
-            </a:endParaRPr>
-          </a:p>
-          <a:p>
-            <a:pPr lvl="3" marL="1600200" indent="-228240">
-              <a:lnSpc>
-                <a:spcPct val="90000"/>
-              </a:lnSpc>
+            <a:endParaRPr b="0" lang="en-US" sz="2400" spc="-1" strike="noStrike">
+              <a:latin typeface="Arial"/>
+            </a:endParaRPr>
+          </a:p>
+          <a:p>
+            <a:pPr lvl="3" marL="1728000" indent="-216000">
               <a:spcBef>
-                <a:spcPts val="499"/>
+                <a:spcPts val="567"/>
               </a:spcBef>
               <a:buClr>
                 <a:srgbClr val="000000"/>
               </a:buClr>
-              <a:buFont typeface="Arial"/>
-              <a:buChar char="•"/>
+              <a:buSzPct val="75000"/>
+              <a:buFont typeface="Symbol" charset="2"/>
+              <a:buChar char=""/>
             </a:pPr>
             <a:r>
-              <a:rPr b="0" lang="de-DE" sz="1800" spc="-1" strike="noStrike">
-                <a:solidFill>
-                  <a:srgbClr val="000000"/>
-                </a:solidFill>
-                <a:latin typeface="Calibri"/>
+              <a:rPr b="0" lang="en-US" sz="2000" spc="-1" strike="noStrike">
+                <a:latin typeface="Arial"/>
               </a:rPr>
-              <a:t>Vierte Ebene</a:t>
+              <a:t>Fourth Outline Level</a:t>
             </a:r>
-            <a:endParaRPr b="0" lang="de-DE" sz="1800" spc="-1" strike="noStrike">
-              <a:solidFill>
-                <a:srgbClr val="000000"/>
-              </a:solidFill>
-              <a:latin typeface="Calibri"/>
-            </a:endParaRPr>
-          </a:p>
-          <a:p>
-            <a:pPr lvl="4" marL="2057400" indent="-228240">
-              <a:lnSpc>
-                <a:spcPct val="90000"/>
-              </a:lnSpc>
+            <a:endParaRPr b="0" lang="en-US" sz="2000" spc="-1" strike="noStrike">
+              <a:latin typeface="Arial"/>
+            </a:endParaRPr>
+          </a:p>
+          <a:p>
+            <a:pPr lvl="4" marL="2160000" indent="-216000">
               <a:spcBef>
-                <a:spcPts val="499"/>
+                <a:spcPts val="283"/>
               </a:spcBef>
               <a:buClr>
                 <a:srgbClr val="000000"/>
               </a:buClr>
-              <a:buFont typeface="Arial"/>
-              <a:buChar char="•"/>
+              <a:buSzPct val="45000"/>
+              <a:buFont typeface="Wingdings" charset="2"/>
+              <a:buChar char=""/>
             </a:pPr>
             <a:r>
-              <a:rPr b="0" lang="de-DE" sz="1800" spc="-1" strike="noStrike">
-                <a:solidFill>
-                  <a:srgbClr val="000000"/>
-                </a:solidFill>
-                <a:latin typeface="Calibri"/>
+              <a:rPr b="0" lang="en-US" sz="2000" spc="-1" strike="noStrike">
+                <a:latin typeface="Arial"/>
               </a:rPr>
-              <a:t>Fünfte Ebene</a:t>
+              <a:t>Fifth Outline Level</a:t>
             </a:r>
-            <a:endParaRPr b="0" lang="de-DE" sz="1800" spc="-1" strike="noStrike">
-              <a:solidFill>
+            <a:endParaRPr b="0" lang="en-US" sz="2000" spc="-1" strike="noStrike">
+              <a:latin typeface="Arial"/>
+            </a:endParaRPr>
+          </a:p>
+          <a:p>
+            <a:pPr lvl="5" marL="2592000" indent="-216000">
+              <a:spcBef>
+                <a:spcPts val="283"/>
+              </a:spcBef>
+              <a:buClr>
                 <a:srgbClr val="000000"/>
-              </a:solidFill>
-              <a:latin typeface="Calibri"/>
-            </a:endParaRPr>
-          </a:p>
-        </p:txBody>
-      </p:sp>
-      <p:sp>
-        <p:nvSpPr>
-          <p:cNvPr id="43" name="PlaceHolder 3"/>
-          <p:cNvSpPr>
-            <a:spLocks noGrp="1"/>
-          </p:cNvSpPr>
-          <p:nvPr>
-            <p:ph type="dt"/>
-          </p:nvPr>
-        </p:nvSpPr>
-        <p:spPr>
-          <a:xfrm>
-            <a:off x="838080" y="6356520"/>
-            <a:ext cx="2742840" cy="364680"/>
-          </a:xfrm>
-          <a:prstGeom prst="rect">
-            <a:avLst/>
-          </a:prstGeom>
-        </p:spPr>
-        <p:txBody>
-          <a:bodyPr anchor="ctr"/>
-          <a:p>
-            <a:pPr>
-              <a:lnSpc>
-                <a:spcPct val="100000"/>
-              </a:lnSpc>
+              </a:buClr>
+              <a:buSzPct val="45000"/>
+              <a:buFont typeface="Wingdings" charset="2"/>
+              <a:buChar char=""/>
             </a:pPr>
-            <a:fld id="{283FBEF6-93F8-4550-8616-755ACA43C5F8}" type="datetime">
-              <a:rPr b="0" lang="en-US" sz="1200" spc="-1" strike="noStrike">
-                <a:solidFill>
-                  <a:srgbClr val="8b8b8b"/>
-                </a:solidFill>
-                <a:latin typeface="Calibri"/>
+            <a:r>
+              <a:rPr b="0" lang="en-US" sz="2000" spc="-1" strike="noStrike">
+                <a:latin typeface="Arial"/>
               </a:rPr>
-              <a:t>5/6/20</a:t>
-            </a:fld>
-            <a:endParaRPr b="0" lang="en-US" sz="1200" spc="-1" strike="noStrike">
-              <a:latin typeface="Times New Roman"/>
-            </a:endParaRPr>
-          </a:p>
-        </p:txBody>
-      </p:sp>
-      <p:sp>
-        <p:nvSpPr>
-          <p:cNvPr id="44" name="PlaceHolder 4"/>
-          <p:cNvSpPr>
-            <a:spLocks noGrp="1"/>
-          </p:cNvSpPr>
-          <p:nvPr>
-            <p:ph type="ftr"/>
-          </p:nvPr>
-        </p:nvSpPr>
-        <p:spPr>
-          <a:xfrm>
-            <a:off x="4038480" y="6356520"/>
-            <a:ext cx="4114440" cy="364680"/>
-          </a:xfrm>
-          <a:prstGeom prst="rect">
-            <a:avLst/>
-          </a:prstGeom>
-        </p:spPr>
-        <p:txBody>
-          <a:bodyPr anchor="ctr"/>
-          <a:p>
-            <a:endParaRPr b="0" lang="en-US" sz="2400" spc="-1" strike="noStrike">
-              <a:latin typeface="Times New Roman"/>
-            </a:endParaRPr>
-          </a:p>
-        </p:txBody>
-      </p:sp>
-      <p:sp>
-        <p:nvSpPr>
-          <p:cNvPr id="45" name="PlaceHolder 5"/>
-          <p:cNvSpPr>
-            <a:spLocks noGrp="1"/>
-          </p:cNvSpPr>
-          <p:nvPr>
-            <p:ph type="sldNum"/>
-          </p:nvPr>
-        </p:nvSpPr>
-        <p:spPr>
-          <a:xfrm>
-            <a:off x="8610480" y="6356520"/>
-            <a:ext cx="2742840" cy="364680"/>
-          </a:xfrm>
-          <a:prstGeom prst="rect">
-            <a:avLst/>
-          </a:prstGeom>
-        </p:spPr>
-        <p:txBody>
-          <a:bodyPr anchor="ctr"/>
-          <a:p>
-            <a:pPr algn="r">
-              <a:lnSpc>
-                <a:spcPct val="100000"/>
-              </a:lnSpc>
+              <a:t>Sixth Outline Level</a:t>
+            </a:r>
+            <a:endParaRPr b="0" lang="en-US" sz="2000" spc="-1" strike="noStrike">
+              <a:latin typeface="Arial"/>
+            </a:endParaRPr>
+          </a:p>
+          <a:p>
+            <a:pPr lvl="6" marL="3024000" indent="-216000">
+              <a:spcBef>
+                <a:spcPts val="283"/>
+              </a:spcBef>
+              <a:buClr>
+                <a:srgbClr val="000000"/>
+              </a:buClr>
+              <a:buSzPct val="45000"/>
+              <a:buFont typeface="Wingdings" charset="2"/>
+              <a:buChar char=""/>
             </a:pPr>
-            <a:fld id="{DAC8628B-1BE1-4A55-8127-3DEC8CDEB65B}" type="slidenum">
-              <a:rPr b="0" lang="en-US" sz="1200" spc="-1" strike="noStrike">
-                <a:solidFill>
-                  <a:srgbClr val="8b8b8b"/>
-                </a:solidFill>
-                <a:latin typeface="Calibri"/>
+            <a:r>
+              <a:rPr b="0" lang="en-US" sz="2000" spc="-1" strike="noStrike">
+                <a:latin typeface="Arial"/>
               </a:rPr>
-              <a:t>&lt;number&gt;</a:t>
-            </a:fld>
-            <a:endParaRPr b="0" lang="en-US" sz="1200" spc="-1" strike="noStrike">
-              <a:latin typeface="Times New Roman"/>
+              <a:t>Seventh Outline Level</a:t>
+            </a:r>
+            <a:endParaRPr b="0" lang="en-US" sz="2000" spc="-1" strike="noStrike">
+              <a:latin typeface="Arial"/>
             </a:endParaRPr>
           </a:p>
         </p:txBody>
@@ -3681,7 +3217,7 @@
       </p:grpSpPr>
       <p:pic>
         <p:nvPicPr>
-          <p:cNvPr id="82" name="Picture 1" descr="">
+          <p:cNvPr id="76" name="Picture 1" descr="">
             <a:hlinkClick r:id="" action="ppaction://media"/>
           </p:cNvPr>
           <p:cNvPicPr/>
@@ -3699,8 +3235,8 @@
         </p:blipFill>
         <p:spPr>
           <a:xfrm>
-            <a:off x="127080" y="0"/>
-            <a:ext cx="11937600" cy="5498640"/>
+            <a:off x="127080" y="79560"/>
+            <a:ext cx="11937240" cy="5498280"/>
           </a:xfrm>
           <a:prstGeom prst="rect">
             <a:avLst/>
@@ -3712,14 +3248,14 @@
       </p:pic>
       <p:sp>
         <p:nvSpPr>
-          <p:cNvPr id="83" name="CustomShape 1"/>
+          <p:cNvPr id="77" name="CustomShape 1"/>
           <p:cNvSpPr/>
           <p:nvPr/>
         </p:nvSpPr>
         <p:spPr>
           <a:xfrm>
             <a:off x="-142560" y="6241680"/>
-            <a:ext cx="3665160" cy="364680"/>
+            <a:ext cx="3664800" cy="364320"/>
           </a:xfrm>
           <a:prstGeom prst="rect">
             <a:avLst/>
@@ -3750,6 +3286,7 @@
                 </a:solidFill>
                 <a:uFillTx/>
                 <a:latin typeface="Calibri"/>
+                <a:ea typeface="DejaVu Sans"/>
                 <a:hlinkClick r:id="rId4"/>
               </a:rPr>
               <a:t>https://about.chartipedia.com/</a:t>
@@ -3792,7 +3329,7 @@
                                       <p:cBhvr>
                                         <p:cTn id="6" dur="8800" fill="hold"/>
                                         <p:tgtEl>
-                                          <p:spTgt spid="82"/>
+                                          <p:spTgt spid="76"/>
                                         </p:tgtEl>
                                       </p:cBhvr>
                                     </p:cmd>
@@ -3827,9 +3364,6 @@
                 <p:childTnLst>
                   <p:par>
                     <p:cTn id="8" fill="hold">
-                      <p:stCondLst>
-                        <p:cond delay="0"/>
-                      </p:stCondLst>
                       <p:childTnLst>
                         <p:par>
                           <p:cTn id="9" fill="hold">
@@ -3847,7 +3381,7 @@
                                       <p:cBhvr>
                                         <p:cTn id="11" dur="1" fill="hold"/>
                                         <p:tgtEl>
-                                          <p:spTgt spid="82"/>
+                                          <p:spTgt spid="76"/>
                                         </p:tgtEl>
                                       </p:cBhvr>
                                     </p:cmd>
@@ -3904,7 +3438,7 @@
       </p:grpSpPr>
       <p:pic>
         <p:nvPicPr>
-          <p:cNvPr id="84" name="Inhaltsplatzhalter 4" descr=""/>
+          <p:cNvPr id="78" name="Inhaltsplatzhalter 4" descr=""/>
           <p:cNvPicPr/>
           <p:nvPr/>
         </p:nvPicPr>
@@ -3916,7 +3450,7 @@
         <p:spPr>
           <a:xfrm>
             <a:off x="0" y="493920"/>
-            <a:ext cx="2704680" cy="2356920"/>
+            <a:ext cx="2704320" cy="2356560"/>
           </a:xfrm>
           <a:prstGeom prst="rect">
             <a:avLst/>
@@ -3928,7 +3462,7 @@
       </p:pic>
       <p:pic>
         <p:nvPicPr>
-          <p:cNvPr id="85" name="Grafik 7" descr=""/>
+          <p:cNvPr id="79" name="Grafik 7" descr=""/>
           <p:cNvPicPr/>
           <p:nvPr/>
         </p:nvPicPr>
@@ -3940,7 +3474,7 @@
         <p:spPr>
           <a:xfrm>
             <a:off x="3206880" y="352080"/>
-            <a:ext cx="5557320" cy="816480"/>
+            <a:ext cx="5556960" cy="816120"/>
           </a:xfrm>
           <a:prstGeom prst="rect">
             <a:avLst/>
@@ -3952,7 +3486,7 @@
       </p:pic>
       <p:pic>
         <p:nvPicPr>
-          <p:cNvPr id="86" name="Grafik 9" descr=""/>
+          <p:cNvPr id="80" name="Grafik 9" descr=""/>
           <p:cNvPicPr/>
           <p:nvPr/>
         </p:nvPicPr>
@@ -3964,7 +3498,7 @@
         <p:spPr>
           <a:xfrm>
             <a:off x="3280680" y="1444680"/>
-            <a:ext cx="3794400" cy="1130400"/>
+            <a:ext cx="3794040" cy="1130040"/>
           </a:xfrm>
           <a:prstGeom prst="rect">
             <a:avLst/>
@@ -3976,7 +3510,7 @@
       </p:pic>
       <p:pic>
         <p:nvPicPr>
-          <p:cNvPr id="87" name="Grafik 10" descr=""/>
+          <p:cNvPr id="81" name="Grafik 10" descr=""/>
           <p:cNvPicPr/>
           <p:nvPr/>
         </p:nvPicPr>
@@ -3988,7 +3522,7 @@
         <p:spPr>
           <a:xfrm>
             <a:off x="501840" y="2851200"/>
-            <a:ext cx="9352080" cy="4006440"/>
+            <a:ext cx="9351720" cy="4006080"/>
           </a:xfrm>
           <a:prstGeom prst="rect">
             <a:avLst/>
@@ -4000,7 +3534,7 @@
       </p:pic>
       <p:pic>
         <p:nvPicPr>
-          <p:cNvPr id="88" name="Grafik 11" descr=""/>
+          <p:cNvPr id="82" name="Grafik 11" descr=""/>
           <p:cNvPicPr/>
           <p:nvPr/>
         </p:nvPicPr>
@@ -4012,7 +3546,7 @@
         <p:spPr>
           <a:xfrm>
             <a:off x="3521880" y="988920"/>
-            <a:ext cx="2222280" cy="359640"/>
+            <a:ext cx="2221920" cy="359280"/>
           </a:xfrm>
           <a:prstGeom prst="rect">
             <a:avLst/>
@@ -4024,7 +3558,7 @@
       </p:pic>
       <p:pic>
         <p:nvPicPr>
-          <p:cNvPr id="89" name="Grafik 5" descr=""/>
+          <p:cNvPr id="83" name="Grafik 5" descr=""/>
           <p:cNvPicPr/>
           <p:nvPr/>
         </p:nvPicPr>
@@ -4036,7 +3570,7 @@
         <p:spPr>
           <a:xfrm>
             <a:off x="3280680" y="2509920"/>
-            <a:ext cx="2704680" cy="665280"/>
+            <a:ext cx="2704320" cy="664920"/>
           </a:xfrm>
           <a:prstGeom prst="rect">
             <a:avLst/>
@@ -4097,7 +3631,7 @@
       </p:grpSpPr>
       <p:pic>
         <p:nvPicPr>
-          <p:cNvPr id="90" name="Inhaltsplatzhalter 4" descr=""/>
+          <p:cNvPr id="84" name="Inhaltsplatzhalter 4" descr=""/>
           <p:cNvPicPr/>
           <p:nvPr/>
         </p:nvPicPr>
@@ -4109,7 +3643,7 @@
         <p:spPr>
           <a:xfrm>
             <a:off x="0" y="493920"/>
-            <a:ext cx="2704680" cy="2356920"/>
+            <a:ext cx="2704320" cy="2356560"/>
           </a:xfrm>
           <a:prstGeom prst="rect">
             <a:avLst/>
@@ -4121,7 +3655,7 @@
       </p:pic>
       <p:pic>
         <p:nvPicPr>
-          <p:cNvPr id="91" name="Grafik 7" descr=""/>
+          <p:cNvPr id="85" name="Grafik 7" descr=""/>
           <p:cNvPicPr/>
           <p:nvPr/>
         </p:nvPicPr>
@@ -4133,7 +3667,7 @@
         <p:spPr>
           <a:xfrm>
             <a:off x="3206880" y="352080"/>
-            <a:ext cx="5557320" cy="816480"/>
+            <a:ext cx="5556960" cy="816120"/>
           </a:xfrm>
           <a:prstGeom prst="rect">
             <a:avLst/>
@@ -4145,7 +3679,7 @@
       </p:pic>
       <p:pic>
         <p:nvPicPr>
-          <p:cNvPr id="92" name="Grafik 9" descr=""/>
+          <p:cNvPr id="86" name="Grafik 9" descr=""/>
           <p:cNvPicPr/>
           <p:nvPr/>
         </p:nvPicPr>
@@ -4157,7 +3691,7 @@
         <p:spPr>
           <a:xfrm>
             <a:off x="3280680" y="1444680"/>
-            <a:ext cx="3794400" cy="1130400"/>
+            <a:ext cx="3794040" cy="1130040"/>
           </a:xfrm>
           <a:prstGeom prst="rect">
             <a:avLst/>
@@ -4169,7 +3703,7 @@
       </p:pic>
       <p:pic>
         <p:nvPicPr>
-          <p:cNvPr id="93" name="Grafik 10" descr=""/>
+          <p:cNvPr id="87" name="Grafik 10" descr=""/>
           <p:cNvPicPr/>
           <p:nvPr/>
         </p:nvPicPr>
@@ -4181,7 +3715,7 @@
         <p:spPr>
           <a:xfrm>
             <a:off x="501840" y="2851200"/>
-            <a:ext cx="9352080" cy="4006440"/>
+            <a:ext cx="9351720" cy="4006080"/>
           </a:xfrm>
           <a:prstGeom prst="rect">
             <a:avLst/>
@@ -4193,7 +3727,7 @@
       </p:pic>
       <p:pic>
         <p:nvPicPr>
-          <p:cNvPr id="94" name="Grafik 11" descr=""/>
+          <p:cNvPr id="88" name="Grafik 11" descr=""/>
           <p:cNvPicPr/>
           <p:nvPr/>
         </p:nvPicPr>
@@ -4205,7 +3739,7 @@
         <p:spPr>
           <a:xfrm>
             <a:off x="3521880" y="988920"/>
-            <a:ext cx="2222280" cy="359640"/>
+            <a:ext cx="2221920" cy="359280"/>
           </a:xfrm>
           <a:prstGeom prst="rect">
             <a:avLst/>
@@ -4217,7 +3751,7 @@
       </p:pic>
       <p:pic>
         <p:nvPicPr>
-          <p:cNvPr id="95" name="Grafik 5" descr=""/>
+          <p:cNvPr id="89" name="Grafik 5" descr=""/>
           <p:cNvPicPr/>
           <p:nvPr/>
         </p:nvPicPr>
@@ -4229,7 +3763,7 @@
         <p:spPr>
           <a:xfrm>
             <a:off x="3280680" y="2509920"/>
-            <a:ext cx="2704680" cy="665280"/>
+            <a:ext cx="2704320" cy="664920"/>
           </a:xfrm>
           <a:prstGeom prst="rect">
             <a:avLst/>
@@ -4290,14 +3824,14 @@
       </p:grpSpPr>
       <p:sp>
         <p:nvSpPr>
-          <p:cNvPr id="96" name="CustomShape 1"/>
+          <p:cNvPr id="90" name="CustomShape 1"/>
           <p:cNvSpPr/>
           <p:nvPr/>
         </p:nvSpPr>
         <p:spPr>
           <a:xfrm>
             <a:off x="0" y="0"/>
-            <a:ext cx="12191760" cy="6857640"/>
+            <a:ext cx="12191400" cy="6857280"/>
           </a:xfrm>
           <a:prstGeom prst="rect">
             <a:avLst/>
@@ -4326,7 +3860,7 @@
       </p:sp>
       <p:pic>
         <p:nvPicPr>
-          <p:cNvPr id="97" name="Inhaltsplatzhalter 4" descr=""/>
+          <p:cNvPr id="91" name="Inhaltsplatzhalter 4" descr=""/>
           <p:cNvPicPr/>
           <p:nvPr/>
         </p:nvPicPr>
@@ -4337,7 +3871,7 @@
         <p:spPr>
           <a:xfrm>
             <a:off x="7336080" y="0"/>
-            <a:ext cx="4855680" cy="6476760"/>
+            <a:ext cx="4855320" cy="6476400"/>
           </a:xfrm>
           <a:prstGeom prst="rect">
             <a:avLst/>
@@ -4356,14 +3890,14 @@
       </p:pic>
       <p:sp>
         <p:nvSpPr>
-          <p:cNvPr id="98" name="CustomShape 2"/>
+          <p:cNvPr id="92" name="CustomShape 2"/>
           <p:cNvSpPr/>
           <p:nvPr/>
         </p:nvSpPr>
         <p:spPr>
           <a:xfrm>
             <a:off x="-46800" y="2320920"/>
-            <a:ext cx="4012560" cy="1095840"/>
+            <a:ext cx="4012200" cy="1095480"/>
           </a:xfrm>
           <a:prstGeom prst="rect">
             <a:avLst/>
@@ -4393,6 +3927,7 @@
                   <a:srgbClr val="f2f2f2"/>
                 </a:solidFill>
                 <a:latin typeface="Calibri"/>
+                <a:ea typeface="DejaVu Sans"/>
               </a:rPr>
               <a:t>Welcome</a:t>
             </a:r>
@@ -4404,14 +3939,14 @@
       </p:sp>
       <p:sp>
         <p:nvSpPr>
-          <p:cNvPr id="99" name="CustomShape 3"/>
+          <p:cNvPr id="93" name="CustomShape 3"/>
           <p:cNvSpPr/>
           <p:nvPr/>
         </p:nvSpPr>
         <p:spPr>
           <a:xfrm>
             <a:off x="251280" y="4213800"/>
-            <a:ext cx="6095520" cy="364680"/>
+            <a:ext cx="6095160" cy="364320"/>
           </a:xfrm>
           <a:prstGeom prst="rect">
             <a:avLst/>
@@ -4442,6 +3977,7 @@
                 </a:solidFill>
                 <a:uFillTx/>
                 <a:latin typeface="Calibri"/>
+                <a:ea typeface="DejaVu Sans"/>
                 <a:hlinkClick r:id="rId2"/>
               </a:rPr>
               <a:t>https://codepen.io/pen/?&amp;editable=true=https%3A%2F%2Fcodepen.io%2Felectricgarden%2Fembed%2FoNNjbqZ%3Fheight%3D603%26theme-id%3Ddefault%26slug-hash%3DoNNjbqZ%26default-tab%3Dresult%26animations%3Drun%26editable%3D%26embed-version%3D2%26preview%3Dtrue%26user%3Delectricgarden%26name%3Dcp_embed_1</a:t>
@@ -4503,14 +4039,14 @@
       </p:grpSpPr>
       <p:sp>
         <p:nvSpPr>
-          <p:cNvPr id="100" name="CustomShape 1"/>
+          <p:cNvPr id="94" name="CustomShape 1"/>
           <p:cNvSpPr/>
           <p:nvPr/>
         </p:nvSpPr>
         <p:spPr>
           <a:xfrm>
             <a:off x="800640" y="-12600"/>
-            <a:ext cx="3133800" cy="3326760"/>
+            <a:ext cx="3133440" cy="3326400"/>
           </a:xfrm>
           <a:prstGeom prst="rect">
             <a:avLst/>
@@ -4542,7 +4078,7 @@
       </p:sp>
       <p:pic>
         <p:nvPicPr>
-          <p:cNvPr id="101" name="Inhaltsplatzhalter 4" descr=""/>
+          <p:cNvPr id="95" name="Inhaltsplatzhalter 4" descr=""/>
           <p:cNvPicPr/>
           <p:nvPr/>
         </p:nvPicPr>
@@ -4553,7 +4089,7 @@
         <p:spPr>
           <a:xfrm>
             <a:off x="7031520" y="91440"/>
-            <a:ext cx="4855680" cy="6476760"/>
+            <a:ext cx="4855320" cy="6476400"/>
           </a:xfrm>
           <a:prstGeom prst="rect">
             <a:avLst/>
@@ -4572,14 +4108,14 @@
       </p:pic>
       <p:sp>
         <p:nvSpPr>
-          <p:cNvPr id="102" name="CustomShape 2"/>
+          <p:cNvPr id="96" name="CustomShape 2"/>
           <p:cNvSpPr/>
           <p:nvPr/>
         </p:nvSpPr>
         <p:spPr>
           <a:xfrm rot="10800000">
-            <a:off x="3909240" y="5181480"/>
-            <a:ext cx="3108240" cy="1866600"/>
+            <a:off x="7017480" y="7048080"/>
+            <a:ext cx="3107880" cy="1866240"/>
           </a:xfrm>
           <a:prstGeom prst="triangle">
             <a:avLst>
@@ -4592,7 +4128,9 @@
               <a:lumOff val="60000"/>
             </a:schemeClr>
           </a:solidFill>
-          <a:ln/>
+          <a:ln>
+            <a:round/>
+          </a:ln>
         </p:spPr>
         <p:style>
           <a:lnRef idx="2">
@@ -4660,7 +4198,7 @@
       </p:grpSpPr>
       <p:pic>
         <p:nvPicPr>
-          <p:cNvPr id="103" name="" descr=""/>
+          <p:cNvPr id="97" name="" descr=""/>
           <p:cNvPicPr/>
           <p:nvPr/>
         </p:nvPicPr>
@@ -4671,7 +4209,7 @@
         <p:spPr>
           <a:xfrm>
             <a:off x="23760" y="-4680"/>
-            <a:ext cx="10277280" cy="6857640"/>
+            <a:ext cx="10276920" cy="6857280"/>
           </a:xfrm>
           <a:prstGeom prst="rect">
             <a:avLst/>
@@ -4683,19 +4221,19 @@
       </p:pic>
       <p:pic>
         <p:nvPicPr>
-          <p:cNvPr id="104" name="" descr=""/>
+          <p:cNvPr id="98" name="" descr=""/>
           <p:cNvPicPr/>
           <p:nvPr/>
         </p:nvPicPr>
         <p:blipFill>
           <a:blip r:embed="rId2"/>
-          <a:srcRect l="62044" t="0" r="0" b="0"/>
+          <a:srcRect l="62034" t="0" r="0" b="0"/>
           <a:stretch/>
         </p:blipFill>
         <p:spPr>
           <a:xfrm>
             <a:off x="8294760" y="9360"/>
-            <a:ext cx="3900240" cy="6857640"/>
+            <a:ext cx="3899880" cy="6857280"/>
           </a:xfrm>
           <a:prstGeom prst="rect">
             <a:avLst/>
@@ -4707,7 +4245,7 @@
       </p:pic>
       <p:pic>
         <p:nvPicPr>
-          <p:cNvPr id="105" name="Inhaltsplatzhalter 4" descr=""/>
+          <p:cNvPr id="99" name="Inhaltsplatzhalter 4" descr=""/>
           <p:cNvPicPr/>
           <p:nvPr/>
         </p:nvPicPr>
@@ -4718,7 +4256,7 @@
         <p:spPr>
           <a:xfrm>
             <a:off x="7130160" y="190800"/>
-            <a:ext cx="4855680" cy="6476760"/>
+            <a:ext cx="4855320" cy="6476400"/>
           </a:xfrm>
           <a:prstGeom prst="rect">
             <a:avLst/>
@@ -4744,6 +4282,605 @@
           <p:childTnLst>
             <p:seq>
               <p:cTn id="21" dur="indefinite" nodeType="mainSeq"/>
+              <p:prevCondLst>
+                <p:cond delay="0" evt="onPrev">
+                  <p:tgtEl>
+                    <p:sldTgt/>
+                  </p:tgtEl>
+                </p:cond>
+              </p:prevCondLst>
+              <p:nextCondLst>
+                <p:cond delay="0" evt="onNext">
+                  <p:tgtEl>
+                    <p:sldTgt/>
+                  </p:tgtEl>
+                </p:cond>
+              </p:nextCondLst>
+            </p:seq>
+          </p:childTnLst>
+        </p:cTn>
+      </p:par>
+    </p:tnLst>
+  </p:timing>
+</p:sld>
+</file>
+
+<file path=ppt/slides/slide7.xml><?xml version="1.0" encoding="utf-8"?>
+<p:sld xmlns:a="http://schemas.openxmlformats.org/drawingml/2006/main" xmlns:p="http://schemas.openxmlformats.org/presentationml/2006/main" xmlns:r="http://schemas.openxmlformats.org/officeDocument/2006/relationships" xmlns:p14="http://schemas.microsoft.com/office/powerpoint/2010/main" xmlns:p15="http://schemas.microsoft.com/office/powerpoint/2012/main" xmlns:mc="http://schemas.openxmlformats.org/markup-compatibility/2006">
+  <p:cSld>
+    <p:spTree>
+      <p:nvGrpSpPr>
+        <p:cNvPr id="1" name=""/>
+        <p:cNvGrpSpPr/>
+        <p:nvPr/>
+      </p:nvGrpSpPr>
+      <p:grpSpPr>
+        <a:xfrm>
+          <a:off x="0" y="0"/>
+          <a:ext cx="0" cy="0"/>
+          <a:chOff x="0" y="0"/>
+          <a:chExt cx="0" cy="0"/>
+        </a:xfrm>
+      </p:grpSpPr>
+      <p:sp>
+        <p:nvSpPr>
+          <p:cNvPr id="100" name="CustomShape 1"/>
+          <p:cNvSpPr/>
+          <p:nvPr/>
+        </p:nvSpPr>
+        <p:spPr>
+          <a:xfrm>
+            <a:off x="1911240" y="817560"/>
+            <a:ext cx="2743200" cy="4485960"/>
+          </a:xfrm>
+          <a:prstGeom prst="flowChartProcess">
+            <a:avLst/>
+          </a:prstGeom>
+          <a:solidFill>
+            <a:srgbClr val="ffffff"/>
+          </a:solidFill>
+          <a:ln w="6480">
+            <a:solidFill>
+              <a:srgbClr val="000000"/>
+            </a:solidFill>
+            <a:round/>
+          </a:ln>
+        </p:spPr>
+        <p:style>
+          <a:lnRef idx="0"/>
+          <a:fillRef idx="0"/>
+          <a:effectRef idx="0"/>
+          <a:fontRef idx="minor"/>
+        </p:style>
+      </p:sp>
+      <p:pic>
+        <p:nvPicPr>
+          <p:cNvPr id="101" name="" descr=""/>
+          <p:cNvPicPr/>
+          <p:nvPr/>
+        </p:nvPicPr>
+        <p:blipFill>
+          <a:blip r:embed="rId1"/>
+          <a:srcRect l="0" t="22412" r="0" b="0"/>
+          <a:stretch/>
+        </p:blipFill>
+        <p:spPr>
+          <a:xfrm>
+            <a:off x="1920240" y="3749040"/>
+            <a:ext cx="2752200" cy="3480120"/>
+          </a:xfrm>
+          <a:prstGeom prst="rect">
+            <a:avLst/>
+          </a:prstGeom>
+          <a:ln w="18360">
+            <a:noFill/>
+          </a:ln>
+        </p:spPr>
+      </p:pic>
+      <p:pic>
+        <p:nvPicPr>
+          <p:cNvPr id="102" name="" descr=""/>
+          <p:cNvPicPr/>
+          <p:nvPr/>
+        </p:nvPicPr>
+        <p:blipFill>
+          <a:blip r:embed="rId2"/>
+          <a:srcRect l="0" t="0" r="0" b="77572"/>
+          <a:stretch/>
+        </p:blipFill>
+        <p:spPr>
+          <a:xfrm>
+            <a:off x="1920240" y="634680"/>
+            <a:ext cx="2752200" cy="1005480"/>
+          </a:xfrm>
+          <a:prstGeom prst="rect">
+            <a:avLst/>
+          </a:prstGeom>
+          <a:ln w="18360">
+            <a:noFill/>
+          </a:ln>
+        </p:spPr>
+      </p:pic>
+      <p:sp>
+        <p:nvSpPr>
+          <p:cNvPr id="103" name="TextShape 2"/>
+          <p:cNvSpPr txBox="1"/>
+          <p:nvPr/>
+        </p:nvSpPr>
+        <p:spPr>
+          <a:xfrm>
+            <a:off x="1920240" y="1645920"/>
+            <a:ext cx="3017520" cy="1882080"/>
+          </a:xfrm>
+          <a:prstGeom prst="rect">
+            <a:avLst/>
+          </a:prstGeom>
+          <a:noFill/>
+          <a:ln w="18360">
+            <a:noFill/>
+          </a:ln>
+        </p:spPr>
+        <p:txBody>
+          <a:bodyPr lIns="90000" rIns="90000" tIns="45000" bIns="45000"/>
+          <a:p>
+            <a:r>
+              <a:rPr b="0" lang="en-US" sz="1800" spc="-1" strike="noStrike">
+                <a:latin typeface="Arial"/>
+              </a:rPr>
+              <a:t>Weight:</a:t>
+            </a:r>
+            <a:endParaRPr b="0" lang="en-US" sz="1800" spc="-1" strike="noStrike">
+              <a:latin typeface="Arial"/>
+            </a:endParaRPr>
+          </a:p>
+          <a:p>
+            <a:r>
+              <a:rPr b="0" lang="en-US" sz="1800" spc="-1" strike="noStrike">
+                <a:latin typeface="Arial"/>
+              </a:rPr>
+              <a:t>Weight_R:</a:t>
+            </a:r>
+            <a:endParaRPr b="0" lang="en-US" sz="1800" spc="-1" strike="noStrike">
+              <a:latin typeface="Arial"/>
+            </a:endParaRPr>
+          </a:p>
+          <a:p>
+            <a:r>
+              <a:rPr b="0" lang="en-US" sz="1800" spc="-1" strike="noStrike">
+                <a:latin typeface="Arial"/>
+              </a:rPr>
+              <a:t>Current Streak: 0 days</a:t>
+            </a:r>
+            <a:endParaRPr b="0" lang="en-US" sz="1800" spc="-1" strike="noStrike">
+              <a:latin typeface="Arial"/>
+            </a:endParaRPr>
+          </a:p>
+          <a:p>
+            <a:r>
+              <a:rPr b="0" lang="en-US" sz="1800" spc="-1" strike="noStrike">
+                <a:latin typeface="Arial"/>
+                <a:ea typeface="Noto Sans CJK SC"/>
+              </a:rPr>
+              <a:t>Streak Target:</a:t>
+            </a:r>
+            <a:r>
+              <a:rPr b="0" lang="en-US" sz="1800" spc="-1" strike="noStrike">
+                <a:latin typeface="Arial"/>
+              </a:rPr>
+              <a:t>  0 days</a:t>
+            </a:r>
+            <a:endParaRPr b="0" lang="en-US" sz="1800" spc="-1" strike="noStrike">
+              <a:latin typeface="Arial"/>
+            </a:endParaRPr>
+          </a:p>
+          <a:p>
+            <a:r>
+              <a:rPr b="0" lang="en-US" sz="1800" spc="-1" strike="noStrike">
+                <a:latin typeface="Arial"/>
+                <a:ea typeface="Noto Sans CJK SC"/>
+              </a:rPr>
+              <a:t>Streak Attempts:</a:t>
+            </a:r>
+            <a:r>
+              <a:rPr b="0" lang="en-US" sz="1800" spc="-1" strike="noStrike">
+                <a:latin typeface="Arial"/>
+              </a:rPr>
+              <a:t> 0 days</a:t>
+            </a:r>
+            <a:endParaRPr b="0" lang="en-US" sz="1800" spc="-1" strike="noStrike">
+              <a:latin typeface="Arial"/>
+            </a:endParaRPr>
+          </a:p>
+          <a:p>
+            <a:r>
+              <a:rPr b="0" lang="en-US" sz="1800" spc="-1" strike="noStrike">
+                <a:latin typeface="Arial"/>
+                <a:ea typeface="Noto Sans CJK SC"/>
+              </a:rPr>
+              <a:t>Longest Strike:</a:t>
+            </a:r>
+            <a:r>
+              <a:rPr b="0" lang="en-US" sz="1800" spc="-1" strike="noStrike">
+                <a:latin typeface="Arial"/>
+              </a:rPr>
+              <a:t> 0 days</a:t>
+            </a:r>
+            <a:endParaRPr b="0" lang="en-US" sz="1800" spc="-1" strike="noStrike">
+              <a:latin typeface="Arial"/>
+            </a:endParaRPr>
+          </a:p>
+          <a:p>
+            <a:r>
+              <a:rPr b="0" lang="en-US" sz="1800" spc="-1" strike="noStrike">
+                <a:latin typeface="Arial"/>
+                <a:ea typeface="Noto Sans CJK SC"/>
+              </a:rPr>
+              <a:t>Shortest Strike:</a:t>
+            </a:r>
+            <a:r>
+              <a:rPr b="0" lang="en-US" sz="1800" spc="-1" strike="noStrike">
+                <a:latin typeface="Arial"/>
+              </a:rPr>
+              <a:t> 0 days</a:t>
+            </a:r>
+            <a:endParaRPr b="0" lang="en-US" sz="1800" spc="-1" strike="noStrike">
+              <a:latin typeface="Arial"/>
+            </a:endParaRPr>
+          </a:p>
+        </p:txBody>
+      </p:sp>
+      <p:sp>
+        <p:nvSpPr>
+          <p:cNvPr id="104" name="TextShape 3"/>
+          <p:cNvSpPr txBox="1"/>
+          <p:nvPr/>
+        </p:nvSpPr>
+        <p:spPr>
+          <a:xfrm>
+            <a:off x="5303520" y="807480"/>
+            <a:ext cx="3291840" cy="6233400"/>
+          </a:xfrm>
+          <a:prstGeom prst="rect">
+            <a:avLst/>
+          </a:prstGeom>
+          <a:noFill/>
+          <a:ln w="18360">
+            <a:noFill/>
+          </a:ln>
+        </p:spPr>
+        <p:txBody>
+          <a:bodyPr lIns="90000" rIns="90000" tIns="45000" bIns="45000"/>
+          <a:p>
+            <a:r>
+              <a:rPr b="0" lang="en-US" sz="1800" spc="-1" strike="noStrike">
+                <a:latin typeface="Arial"/>
+              </a:rPr>
+              <a:t>Technical implementation:</a:t>
+            </a:r>
+            <a:endParaRPr b="0" lang="en-US" sz="1800" spc="-1" strike="noStrike">
+              <a:latin typeface="Arial"/>
+            </a:endParaRPr>
+          </a:p>
+          <a:p>
+            <a:r>
+              <a:rPr b="0" lang="en-US" sz="1800" spc="-1" strike="noStrike">
+                <a:latin typeface="Arial"/>
+              </a:rPr>
+              <a:t>New url to get the strike information:</a:t>
+            </a:r>
+            <a:endParaRPr b="0" lang="en-US" sz="1800" spc="-1" strike="noStrike">
+              <a:latin typeface="Arial"/>
+            </a:endParaRPr>
+          </a:p>
+          <a:p>
+            <a:endParaRPr b="0" lang="en-US" sz="1800" spc="-1" strike="noStrike">
+              <a:latin typeface="Arial"/>
+            </a:endParaRPr>
+          </a:p>
+          <a:p>
+            <a:r>
+              <a:rPr b="0" lang="en-US" sz="1800" spc="-1" strike="noStrike">
+                <a:latin typeface="Arial"/>
+              </a:rPr>
+              <a:t>Based on a weight it returns the information:</a:t>
+            </a:r>
+            <a:endParaRPr b="0" lang="en-US" sz="1800" spc="-1" strike="noStrike">
+              <a:latin typeface="Arial"/>
+            </a:endParaRPr>
+          </a:p>
+          <a:p>
+            <a:endParaRPr b="0" lang="en-US" sz="1800" spc="-1" strike="noStrike">
+              <a:latin typeface="Arial"/>
+            </a:endParaRPr>
+          </a:p>
+          <a:p>
+            <a:r>
+              <a:rPr b="0" lang="en-US" sz="1800" spc="-1" strike="noStrike">
+                <a:latin typeface="Arial"/>
+              </a:rPr>
+              <a:t>##Current Strike##:</a:t>
+            </a:r>
+            <a:endParaRPr b="0" lang="en-US" sz="1800" spc="-1" strike="noStrike">
+              <a:latin typeface="Arial"/>
+            </a:endParaRPr>
+          </a:p>
+          <a:p>
+            <a:r>
+              <a:rPr b="0" lang="en-US" sz="1800" spc="-1" strike="noStrike">
+                <a:latin typeface="Arial"/>
+              </a:rPr>
+              <a:t>#1.Step Query all data</a:t>
+            </a:r>
+            <a:endParaRPr b="0" lang="en-US" sz="1800" spc="-1" strike="noStrike">
+              <a:latin typeface="Arial"/>
+            </a:endParaRPr>
+          </a:p>
+          <a:p>
+            <a:r>
+              <a:rPr b="0" lang="en-US" sz="1800" spc="-1" strike="noStrike">
+                <a:latin typeface="Arial"/>
+              </a:rPr>
+              <a:t>#2. Step: Sort by data</a:t>
+            </a:r>
+            <a:endParaRPr b="0" lang="en-US" sz="1800" spc="-1" strike="noStrike">
+              <a:latin typeface="Arial"/>
+            </a:endParaRPr>
+          </a:p>
+          <a:p>
+            <a:r>
+              <a:rPr b="0" lang="en-US" sz="1800" spc="-1" strike="noStrike">
+                <a:latin typeface="Arial"/>
+              </a:rPr>
+              <a:t>#3. Step: Loop for days,</a:t>
+            </a:r>
+            <a:endParaRPr b="0" lang="en-US" sz="1800" spc="-1" strike="noStrike">
+              <a:latin typeface="Arial"/>
+            </a:endParaRPr>
+          </a:p>
+          <a:p>
+            <a:r>
+              <a:rPr b="0" lang="en-US" sz="1800" spc="-1" strike="noStrike">
+                <a:latin typeface="Arial"/>
+              </a:rPr>
+              <a:t>Check if previous day is still under the “weight” if not stop the loop</a:t>
+            </a:r>
+            <a:endParaRPr b="0" lang="en-US" sz="1800" spc="-1" strike="noStrike">
+              <a:latin typeface="Arial"/>
+            </a:endParaRPr>
+          </a:p>
+          <a:p>
+            <a:endParaRPr b="0" lang="en-US" sz="1800" spc="-1" strike="noStrike">
+              <a:latin typeface="Arial"/>
+            </a:endParaRPr>
+          </a:p>
+          <a:p>
+            <a:r>
+              <a:rPr b="0" lang="en-US" sz="1800" spc="-1" strike="noStrike">
+                <a:latin typeface="Arial"/>
+                <a:ea typeface="Noto Sans CJK SC"/>
+              </a:rPr>
+              <a:t>##Streak Attempts</a:t>
+            </a:r>
+            <a:r>
+              <a:rPr b="0" lang="en-US" sz="1800" spc="-1" strike="noStrike">
+                <a:latin typeface="Arial"/>
+              </a:rPr>
+              <a:t>##</a:t>
+            </a:r>
+            <a:endParaRPr b="0" lang="en-US" sz="1800" spc="-1" strike="noStrike">
+              <a:latin typeface="Arial"/>
+            </a:endParaRPr>
+          </a:p>
+          <a:p>
+            <a:r>
+              <a:rPr b="0" lang="en-US" sz="1800" spc="-1" strike="noStrike">
+                <a:latin typeface="Arial"/>
+              </a:rPr>
+              <a:t>#1.Step:try bins</a:t>
+            </a:r>
+            <a:endParaRPr b="0" lang="en-US" sz="1800" spc="-1" strike="noStrike">
+              <a:latin typeface="Arial"/>
+            </a:endParaRPr>
+          </a:p>
+          <a:p>
+            <a:r>
+              <a:rPr b="0" lang="en-US" sz="1800" spc="-1" strike="noStrike">
+                <a:latin typeface="Arial"/>
+                <a:ea typeface="Noto Sans CJK SC"/>
+              </a:rPr>
+              <a:t>## Longest Strike</a:t>
+            </a:r>
+            <a:r>
+              <a:rPr b="0" lang="en-US" sz="1800" spc="-1" strike="noStrike">
+                <a:latin typeface="Arial"/>
+              </a:rPr>
+              <a:t>##</a:t>
+            </a:r>
+            <a:endParaRPr b="0" lang="en-US" sz="1800" spc="-1" strike="noStrike">
+              <a:latin typeface="Arial"/>
+            </a:endParaRPr>
+          </a:p>
+          <a:p>
+            <a:r>
+              <a:rPr b="0" lang="en-US" sz="1800" spc="-1" strike="noStrike">
+                <a:latin typeface="Arial"/>
+              </a:rPr>
+              <a:t>#1.Step:try bins</a:t>
+            </a:r>
+            <a:endParaRPr b="0" lang="en-US" sz="1800" spc="-1" strike="noStrike">
+              <a:latin typeface="Arial"/>
+            </a:endParaRPr>
+          </a:p>
+          <a:p>
+            <a:r>
+              <a:rPr b="0" lang="en-US" sz="1800" spc="-1" strike="noStrike">
+                <a:latin typeface="Arial"/>
+                <a:ea typeface="Noto Sans CJK SC"/>
+              </a:rPr>
+              <a:t>## Shortest Strike</a:t>
+            </a:r>
+            <a:r>
+              <a:rPr b="0" lang="en-US" sz="1800" spc="-1" strike="noStrike">
+                <a:latin typeface="Arial"/>
+              </a:rPr>
+              <a:t>##</a:t>
+            </a:r>
+            <a:endParaRPr b="0" lang="en-US" sz="1800" spc="-1" strike="noStrike">
+              <a:latin typeface="Arial"/>
+            </a:endParaRPr>
+          </a:p>
+          <a:p>
+            <a:r>
+              <a:rPr b="0" lang="en-US" sz="1800" spc="-1" strike="noStrike">
+                <a:latin typeface="Arial"/>
+              </a:rPr>
+              <a:t>#1.Step:try bins</a:t>
+            </a:r>
+            <a:endParaRPr b="0" lang="en-US" sz="1800" spc="-1" strike="noStrike">
+              <a:latin typeface="Arial"/>
+            </a:endParaRPr>
+          </a:p>
+          <a:p>
+            <a:r>
+              <a:rPr b="0" lang="en-US" sz="1800" spc="-1" strike="noStrike">
+                <a:latin typeface="Arial"/>
+              </a:rPr>
+              <a:t> </a:t>
+            </a:r>
+            <a:endParaRPr b="0" lang="en-US" sz="1800" spc="-1" strike="noStrike">
+              <a:latin typeface="Arial"/>
+            </a:endParaRPr>
+          </a:p>
+          <a:p>
+            <a:endParaRPr b="0" lang="en-US" sz="1800" spc="-1" strike="noStrike">
+              <a:latin typeface="Arial"/>
+            </a:endParaRPr>
+          </a:p>
+          <a:p>
+            <a:endParaRPr b="0" lang="en-US" sz="1800" spc="-1" strike="noStrike">
+              <a:latin typeface="Arial"/>
+            </a:endParaRPr>
+          </a:p>
+        </p:txBody>
+      </p:sp>
+      <p:pic>
+        <p:nvPicPr>
+          <p:cNvPr id="105" name="" descr=""/>
+          <p:cNvPicPr/>
+          <p:nvPr/>
+        </p:nvPicPr>
+        <p:blipFill>
+          <a:blip r:embed="rId3"/>
+          <a:stretch/>
+        </p:blipFill>
+        <p:spPr>
+          <a:xfrm>
+            <a:off x="1947240" y="1183320"/>
+            <a:ext cx="809280" cy="456840"/>
+          </a:xfrm>
+          <a:prstGeom prst="rect">
+            <a:avLst/>
+          </a:prstGeom>
+          <a:ln w="18360">
+            <a:noFill/>
+          </a:ln>
+        </p:spPr>
+      </p:pic>
+      <p:pic>
+        <p:nvPicPr>
+          <p:cNvPr id="106" name="" descr=""/>
+          <p:cNvPicPr/>
+          <p:nvPr/>
+        </p:nvPicPr>
+        <p:blipFill>
+          <a:blip r:embed="rId4"/>
+          <a:srcRect l="0" t="11748" r="0" b="77572"/>
+          <a:stretch/>
+        </p:blipFill>
+        <p:spPr>
+          <a:xfrm>
+            <a:off x="2002680" y="3272040"/>
+            <a:ext cx="2752200" cy="478440"/>
+          </a:xfrm>
+          <a:prstGeom prst="rect">
+            <a:avLst/>
+          </a:prstGeom>
+          <a:ln w="18360">
+            <a:noFill/>
+          </a:ln>
+        </p:spPr>
+      </p:pic>
+      <p:sp>
+        <p:nvSpPr>
+          <p:cNvPr id="107" name="CustomShape 4"/>
+          <p:cNvSpPr/>
+          <p:nvPr/>
+        </p:nvSpPr>
+        <p:spPr>
+          <a:xfrm>
+            <a:off x="3200400" y="1640160"/>
+            <a:ext cx="1371600" cy="274320"/>
+          </a:xfrm>
+          <a:prstGeom prst="rect">
+            <a:avLst/>
+          </a:prstGeom>
+          <a:solidFill>
+            <a:srgbClr val="ffffff"/>
+          </a:solidFill>
+          <a:ln w="18360">
+            <a:solidFill>
+              <a:srgbClr val="000000"/>
+            </a:solidFill>
+            <a:round/>
+          </a:ln>
+        </p:spPr>
+        <p:style>
+          <a:lnRef idx="0"/>
+          <a:fillRef idx="0"/>
+          <a:effectRef idx="0"/>
+          <a:fontRef idx="minor"/>
+        </p:style>
+      </p:sp>
+      <p:sp>
+        <p:nvSpPr>
+          <p:cNvPr id="108" name="CustomShape 5"/>
+          <p:cNvSpPr/>
+          <p:nvPr/>
+        </p:nvSpPr>
+        <p:spPr>
+          <a:xfrm>
+            <a:off x="3200400" y="1920240"/>
+            <a:ext cx="1371600" cy="274320"/>
+          </a:xfrm>
+          <a:prstGeom prst="rect">
+            <a:avLst/>
+          </a:prstGeom>
+          <a:solidFill>
+            <a:srgbClr val="ffffff"/>
+          </a:solidFill>
+          <a:ln w="18360">
+            <a:solidFill>
+              <a:srgbClr val="000000"/>
+            </a:solidFill>
+            <a:round/>
+          </a:ln>
+        </p:spPr>
+        <p:style>
+          <a:lnRef idx="0"/>
+          <a:fillRef idx="0"/>
+          <a:effectRef idx="0"/>
+          <a:fontRef idx="minor"/>
+        </p:style>
+      </p:sp>
+    </p:spTree>
+  </p:cSld>
+  <p:timing>
+    <p:tnLst>
+      <p:par>
+        <p:cTn id="22" dur="indefinite" restart="never" nodeType="tmRoot">
+          <p:childTnLst>
+            <p:seq>
+              <p:cTn id="23" dur="indefinite" nodeType="mainSeq"/>
               <p:prevCondLst>
                 <p:cond delay="0" evt="onPrev">
                   <p:tgtEl>

</xml_diff>